<commit_message>
revised slide deck & made unit plan more readable
</commit_message>
<xml_diff>
--- a/Database, Day 00 presentation.pptx
+++ b/Database, Day 00 presentation.pptx
@@ -1,6 +1,6 @@
 
 <file path=ppt/presentation.xml><?xml version="1.0" encoding="utf-8"?>
-<p:presentation xmlns:a="http://schemas.openxmlformats.org/drawingml/2006/main" xmlns:r="http://schemas.openxmlformats.org/officeDocument/2006/relationships" xmlns:mc="http://schemas.openxmlformats.org/markup-compatibility/2006" xmlns:mv="urn:schemas-microsoft-com:mac:vml" xmlns:p="http://schemas.openxmlformats.org/presentationml/2006/main" xmlns:c="http://schemas.openxmlformats.org/drawingml/2006/chart" xmlns:dgm="http://schemas.openxmlformats.org/drawingml/2006/diagram" xmlns:o="urn:schemas-microsoft-com:office:office" xmlns:v="urn:schemas-microsoft-com:vml" xmlns:pvml="urn:schemas-microsoft-com:office:powerpoint" xmlns:com="http://schemas.openxmlformats.org/drawingml/2006/compatibility" xmlns:p14="http://schemas.microsoft.com/office/powerpoint/2010/main" xmlns:p15="http://schemas.microsoft.com/office/powerpoint/2012/main" autoCompressPictures="0" embedTrueTypeFonts="1" strictFirstAndLastChars="0" saveSubsetFonts="1">
+<p:presentation xmlns:a="http://schemas.openxmlformats.org/drawingml/2006/main" xmlns:r="http://schemas.openxmlformats.org/officeDocument/2006/relationships" xmlns:mc="http://schemas.openxmlformats.org/markup-compatibility/2006" xmlns:mv="urn:schemas-microsoft-com:mac:vml" xmlns:p="http://schemas.openxmlformats.org/presentationml/2006/main" xmlns:c="http://schemas.openxmlformats.org/drawingml/2006/chart" xmlns:dgm="http://schemas.openxmlformats.org/drawingml/2006/diagram" xmlns:o="urn:schemas-microsoft-com:office:office" xmlns:v="urn:schemas-microsoft-com:vml" xmlns:pvml="urn:schemas-microsoft-com:office:powerpoint" xmlns:com="http://schemas.openxmlformats.org/drawingml/2006/compatibility" xmlns:p14="http://schemas.microsoft.com/office/powerpoint/2010/main" xmlns:p15="http://schemas.microsoft.com/office/powerpoint/2012/main" xmlns:ahyp="http://schemas.microsoft.com/office/drawing/2018/hyperlinkcolor" autoCompressPictures="0" embedTrueTypeFonts="1" strictFirstAndLastChars="0" saveSubsetFonts="1">
   <p:sldMasterIdLst>
     <p:sldMasterId id="2147483659" r:id="rId4"/>
   </p:sldMasterIdLst>
@@ -277,7 +277,7 @@
 </file>
 
 <file path=ppt/notesMasters/notesMaster1.xml><?xml version="1.0" encoding="utf-8"?>
-<p:notesMaster xmlns:a="http://schemas.openxmlformats.org/drawingml/2006/main" xmlns:r="http://schemas.openxmlformats.org/officeDocument/2006/relationships" xmlns:mc="http://schemas.openxmlformats.org/markup-compatibility/2006" xmlns:mv="urn:schemas-microsoft-com:mac:vml" xmlns:p="http://schemas.openxmlformats.org/presentationml/2006/main" xmlns:c="http://schemas.openxmlformats.org/drawingml/2006/chart" xmlns:dgm="http://schemas.openxmlformats.org/drawingml/2006/diagram" xmlns:o="urn:schemas-microsoft-com:office:office" xmlns:v="urn:schemas-microsoft-com:vml" xmlns:pvml="urn:schemas-microsoft-com:office:powerpoint" xmlns:com="http://schemas.openxmlformats.org/drawingml/2006/compatibility" xmlns:p14="http://schemas.microsoft.com/office/powerpoint/2010/main" xmlns:p15="http://schemas.microsoft.com/office/powerpoint/2012/main">
+<p:notesMaster xmlns:a="http://schemas.openxmlformats.org/drawingml/2006/main" xmlns:r="http://schemas.openxmlformats.org/officeDocument/2006/relationships" xmlns:mc="http://schemas.openxmlformats.org/markup-compatibility/2006" xmlns:mv="urn:schemas-microsoft-com:mac:vml" xmlns:p="http://schemas.openxmlformats.org/presentationml/2006/main" xmlns:c="http://schemas.openxmlformats.org/drawingml/2006/chart" xmlns:dgm="http://schemas.openxmlformats.org/drawingml/2006/diagram" xmlns:o="urn:schemas-microsoft-com:office:office" xmlns:v="urn:schemas-microsoft-com:vml" xmlns:pvml="urn:schemas-microsoft-com:office:powerpoint" xmlns:com="http://schemas.openxmlformats.org/drawingml/2006/compatibility" xmlns:p14="http://schemas.microsoft.com/office/powerpoint/2010/main" xmlns:p15="http://schemas.microsoft.com/office/powerpoint/2012/main" xmlns:ahyp="http://schemas.microsoft.com/office/drawing/2018/hyperlinkcolor">
   <p:cSld>
     <p:spTree>
       <p:nvGrpSpPr>
@@ -703,7 +703,7 @@
 </file>
 
 <file path=ppt/notesSlides/notesSlide1.xml><?xml version="1.0" encoding="utf-8"?>
-<p:notes xmlns:a="http://schemas.openxmlformats.org/drawingml/2006/main" xmlns:r="http://schemas.openxmlformats.org/officeDocument/2006/relationships" xmlns:mc="http://schemas.openxmlformats.org/markup-compatibility/2006" xmlns:mv="urn:schemas-microsoft-com:mac:vml" xmlns:p="http://schemas.openxmlformats.org/presentationml/2006/main" xmlns:c="http://schemas.openxmlformats.org/drawingml/2006/chart" xmlns:dgm="http://schemas.openxmlformats.org/drawingml/2006/diagram" xmlns:o="urn:schemas-microsoft-com:office:office" xmlns:v="urn:schemas-microsoft-com:vml" xmlns:pvml="urn:schemas-microsoft-com:office:powerpoint" xmlns:com="http://schemas.openxmlformats.org/drawingml/2006/compatibility" xmlns:p14="http://schemas.microsoft.com/office/powerpoint/2010/main" xmlns:p15="http://schemas.microsoft.com/office/powerpoint/2012/main" showMasterPhAnim="0" showMasterSp="0">
+<p:notes xmlns:a="http://schemas.openxmlformats.org/drawingml/2006/main" xmlns:r="http://schemas.openxmlformats.org/officeDocument/2006/relationships" xmlns:mc="http://schemas.openxmlformats.org/markup-compatibility/2006" xmlns:mv="urn:schemas-microsoft-com:mac:vml" xmlns:p="http://schemas.openxmlformats.org/presentationml/2006/main" xmlns:c="http://schemas.openxmlformats.org/drawingml/2006/chart" xmlns:dgm="http://schemas.openxmlformats.org/drawingml/2006/diagram" xmlns:o="urn:schemas-microsoft-com:office:office" xmlns:v="urn:schemas-microsoft-com:vml" xmlns:pvml="urn:schemas-microsoft-com:office:powerpoint" xmlns:com="http://schemas.openxmlformats.org/drawingml/2006/compatibility" xmlns:p14="http://schemas.microsoft.com/office/powerpoint/2010/main" xmlns:p15="http://schemas.microsoft.com/office/powerpoint/2012/main" xmlns:ahyp="http://schemas.microsoft.com/office/drawing/2018/hyperlinkcolor" showMasterPhAnim="0" showMasterSp="0">
   <p:cSld>
     <p:spTree>
       <p:nvGrpSpPr>
@@ -802,7 +802,7 @@
 </file>
 
 <file path=ppt/notesSlides/notesSlide2.xml><?xml version="1.0" encoding="utf-8"?>
-<p:notes xmlns:a="http://schemas.openxmlformats.org/drawingml/2006/main" xmlns:r="http://schemas.openxmlformats.org/officeDocument/2006/relationships" xmlns:mc="http://schemas.openxmlformats.org/markup-compatibility/2006" xmlns:mv="urn:schemas-microsoft-com:mac:vml" xmlns:p="http://schemas.openxmlformats.org/presentationml/2006/main" xmlns:c="http://schemas.openxmlformats.org/drawingml/2006/chart" xmlns:dgm="http://schemas.openxmlformats.org/drawingml/2006/diagram" xmlns:o="urn:schemas-microsoft-com:office:office" xmlns:v="urn:schemas-microsoft-com:vml" xmlns:pvml="urn:schemas-microsoft-com:office:powerpoint" xmlns:com="http://schemas.openxmlformats.org/drawingml/2006/compatibility" xmlns:p14="http://schemas.microsoft.com/office/powerpoint/2010/main" xmlns:p15="http://schemas.microsoft.com/office/powerpoint/2012/main" showMasterPhAnim="0" showMasterSp="0">
+<p:notes xmlns:a="http://schemas.openxmlformats.org/drawingml/2006/main" xmlns:r="http://schemas.openxmlformats.org/officeDocument/2006/relationships" xmlns:mc="http://schemas.openxmlformats.org/markup-compatibility/2006" xmlns:mv="urn:schemas-microsoft-com:mac:vml" xmlns:p="http://schemas.openxmlformats.org/presentationml/2006/main" xmlns:c="http://schemas.openxmlformats.org/drawingml/2006/chart" xmlns:dgm="http://schemas.openxmlformats.org/drawingml/2006/diagram" xmlns:o="urn:schemas-microsoft-com:office:office" xmlns:v="urn:schemas-microsoft-com:vml" xmlns:pvml="urn:schemas-microsoft-com:office:powerpoint" xmlns:com="http://schemas.openxmlformats.org/drawingml/2006/compatibility" xmlns:p14="http://schemas.microsoft.com/office/powerpoint/2010/main" xmlns:p15="http://schemas.microsoft.com/office/powerpoint/2012/main" xmlns:ahyp="http://schemas.microsoft.com/office/drawing/2018/hyperlinkcolor" showMasterPhAnim="0" showMasterSp="0">
   <p:cSld>
     <p:spTree>
       <p:nvGrpSpPr>
@@ -901,7 +901,7 @@
 </file>
 
 <file path=ppt/notesSlides/notesSlide3.xml><?xml version="1.0" encoding="utf-8"?>
-<p:notes xmlns:a="http://schemas.openxmlformats.org/drawingml/2006/main" xmlns:r="http://schemas.openxmlformats.org/officeDocument/2006/relationships" xmlns:mc="http://schemas.openxmlformats.org/markup-compatibility/2006" xmlns:mv="urn:schemas-microsoft-com:mac:vml" xmlns:p="http://schemas.openxmlformats.org/presentationml/2006/main" xmlns:c="http://schemas.openxmlformats.org/drawingml/2006/chart" xmlns:dgm="http://schemas.openxmlformats.org/drawingml/2006/diagram" xmlns:o="urn:schemas-microsoft-com:office:office" xmlns:v="urn:schemas-microsoft-com:vml" xmlns:pvml="urn:schemas-microsoft-com:office:powerpoint" xmlns:com="http://schemas.openxmlformats.org/drawingml/2006/compatibility" xmlns:p14="http://schemas.microsoft.com/office/powerpoint/2010/main" xmlns:p15="http://schemas.microsoft.com/office/powerpoint/2012/main" showMasterPhAnim="0" showMasterSp="0">
+<p:notes xmlns:a="http://schemas.openxmlformats.org/drawingml/2006/main" xmlns:r="http://schemas.openxmlformats.org/officeDocument/2006/relationships" xmlns:mc="http://schemas.openxmlformats.org/markup-compatibility/2006" xmlns:mv="urn:schemas-microsoft-com:mac:vml" xmlns:p="http://schemas.openxmlformats.org/presentationml/2006/main" xmlns:c="http://schemas.openxmlformats.org/drawingml/2006/chart" xmlns:dgm="http://schemas.openxmlformats.org/drawingml/2006/diagram" xmlns:o="urn:schemas-microsoft-com:office:office" xmlns:v="urn:schemas-microsoft-com:vml" xmlns:pvml="urn:schemas-microsoft-com:office:powerpoint" xmlns:com="http://schemas.openxmlformats.org/drawingml/2006/compatibility" xmlns:p14="http://schemas.microsoft.com/office/powerpoint/2010/main" xmlns:p15="http://schemas.microsoft.com/office/powerpoint/2012/main" xmlns:ahyp="http://schemas.microsoft.com/office/drawing/2018/hyperlinkcolor" showMasterPhAnim="0" showMasterSp="0">
   <p:cSld>
     <p:spTree>
       <p:nvGrpSpPr>
@@ -1000,7 +1000,7 @@
 </file>
 
 <file path=ppt/notesSlides/notesSlide4.xml><?xml version="1.0" encoding="utf-8"?>
-<p:notes xmlns:a="http://schemas.openxmlformats.org/drawingml/2006/main" xmlns:r="http://schemas.openxmlformats.org/officeDocument/2006/relationships" xmlns:mc="http://schemas.openxmlformats.org/markup-compatibility/2006" xmlns:mv="urn:schemas-microsoft-com:mac:vml" xmlns:p="http://schemas.openxmlformats.org/presentationml/2006/main" xmlns:c="http://schemas.openxmlformats.org/drawingml/2006/chart" xmlns:dgm="http://schemas.openxmlformats.org/drawingml/2006/diagram" xmlns:o="urn:schemas-microsoft-com:office:office" xmlns:v="urn:schemas-microsoft-com:vml" xmlns:pvml="urn:schemas-microsoft-com:office:powerpoint" xmlns:com="http://schemas.openxmlformats.org/drawingml/2006/compatibility" xmlns:p14="http://schemas.microsoft.com/office/powerpoint/2010/main" xmlns:p15="http://schemas.microsoft.com/office/powerpoint/2012/main" showMasterPhAnim="0" showMasterSp="0">
+<p:notes xmlns:a="http://schemas.openxmlformats.org/drawingml/2006/main" xmlns:r="http://schemas.openxmlformats.org/officeDocument/2006/relationships" xmlns:mc="http://schemas.openxmlformats.org/markup-compatibility/2006" xmlns:mv="urn:schemas-microsoft-com:mac:vml" xmlns:p="http://schemas.openxmlformats.org/presentationml/2006/main" xmlns:c="http://schemas.openxmlformats.org/drawingml/2006/chart" xmlns:dgm="http://schemas.openxmlformats.org/drawingml/2006/diagram" xmlns:o="urn:schemas-microsoft-com:office:office" xmlns:v="urn:schemas-microsoft-com:vml" xmlns:pvml="urn:schemas-microsoft-com:office:powerpoint" xmlns:com="http://schemas.openxmlformats.org/drawingml/2006/compatibility" xmlns:p14="http://schemas.microsoft.com/office/powerpoint/2010/main" xmlns:p15="http://schemas.microsoft.com/office/powerpoint/2012/main" xmlns:ahyp="http://schemas.microsoft.com/office/drawing/2018/hyperlinkcolor" showMasterPhAnim="0" showMasterSp="0">
   <p:cSld>
     <p:spTree>
       <p:nvGrpSpPr>
@@ -1099,7 +1099,7 @@
 </file>
 
 <file path=ppt/notesSlides/notesSlide5.xml><?xml version="1.0" encoding="utf-8"?>
-<p:notes xmlns:a="http://schemas.openxmlformats.org/drawingml/2006/main" xmlns:r="http://schemas.openxmlformats.org/officeDocument/2006/relationships" xmlns:mc="http://schemas.openxmlformats.org/markup-compatibility/2006" xmlns:mv="urn:schemas-microsoft-com:mac:vml" xmlns:p="http://schemas.openxmlformats.org/presentationml/2006/main" xmlns:c="http://schemas.openxmlformats.org/drawingml/2006/chart" xmlns:dgm="http://schemas.openxmlformats.org/drawingml/2006/diagram" xmlns:o="urn:schemas-microsoft-com:office:office" xmlns:v="urn:schemas-microsoft-com:vml" xmlns:pvml="urn:schemas-microsoft-com:office:powerpoint" xmlns:com="http://schemas.openxmlformats.org/drawingml/2006/compatibility" xmlns:p14="http://schemas.microsoft.com/office/powerpoint/2010/main" xmlns:p15="http://schemas.microsoft.com/office/powerpoint/2012/main" showMasterPhAnim="0" showMasterSp="0">
+<p:notes xmlns:a="http://schemas.openxmlformats.org/drawingml/2006/main" xmlns:r="http://schemas.openxmlformats.org/officeDocument/2006/relationships" xmlns:mc="http://schemas.openxmlformats.org/markup-compatibility/2006" xmlns:mv="urn:schemas-microsoft-com:mac:vml" xmlns:p="http://schemas.openxmlformats.org/presentationml/2006/main" xmlns:c="http://schemas.openxmlformats.org/drawingml/2006/chart" xmlns:dgm="http://schemas.openxmlformats.org/drawingml/2006/diagram" xmlns:o="urn:schemas-microsoft-com:office:office" xmlns:v="urn:schemas-microsoft-com:vml" xmlns:pvml="urn:schemas-microsoft-com:office:powerpoint" xmlns:com="http://schemas.openxmlformats.org/drawingml/2006/compatibility" xmlns:p14="http://schemas.microsoft.com/office/powerpoint/2010/main" xmlns:p15="http://schemas.microsoft.com/office/powerpoint/2012/main" xmlns:ahyp="http://schemas.microsoft.com/office/drawing/2018/hyperlinkcolor" showMasterPhAnim="0" showMasterSp="0">
   <p:cSld>
     <p:spTree>
       <p:nvGrpSpPr>
@@ -1198,7 +1198,7 @@
 </file>
 
 <file path=ppt/notesSlides/notesSlide6.xml><?xml version="1.0" encoding="utf-8"?>
-<p:notes xmlns:a="http://schemas.openxmlformats.org/drawingml/2006/main" xmlns:r="http://schemas.openxmlformats.org/officeDocument/2006/relationships" xmlns:mc="http://schemas.openxmlformats.org/markup-compatibility/2006" xmlns:mv="urn:schemas-microsoft-com:mac:vml" xmlns:p="http://schemas.openxmlformats.org/presentationml/2006/main" xmlns:c="http://schemas.openxmlformats.org/drawingml/2006/chart" xmlns:dgm="http://schemas.openxmlformats.org/drawingml/2006/diagram" xmlns:o="urn:schemas-microsoft-com:office:office" xmlns:v="urn:schemas-microsoft-com:vml" xmlns:pvml="urn:schemas-microsoft-com:office:powerpoint" xmlns:com="http://schemas.openxmlformats.org/drawingml/2006/compatibility" xmlns:p14="http://schemas.microsoft.com/office/powerpoint/2010/main" xmlns:p15="http://schemas.microsoft.com/office/powerpoint/2012/main" showMasterPhAnim="0" showMasterSp="0">
+<p:notes xmlns:a="http://schemas.openxmlformats.org/drawingml/2006/main" xmlns:r="http://schemas.openxmlformats.org/officeDocument/2006/relationships" xmlns:mc="http://schemas.openxmlformats.org/markup-compatibility/2006" xmlns:mv="urn:schemas-microsoft-com:mac:vml" xmlns:p="http://schemas.openxmlformats.org/presentationml/2006/main" xmlns:c="http://schemas.openxmlformats.org/drawingml/2006/chart" xmlns:dgm="http://schemas.openxmlformats.org/drawingml/2006/diagram" xmlns:o="urn:schemas-microsoft-com:office:office" xmlns:v="urn:schemas-microsoft-com:vml" xmlns:pvml="urn:schemas-microsoft-com:office:powerpoint" xmlns:com="http://schemas.openxmlformats.org/drawingml/2006/compatibility" xmlns:p14="http://schemas.microsoft.com/office/powerpoint/2010/main" xmlns:p15="http://schemas.microsoft.com/office/powerpoint/2012/main" xmlns:ahyp="http://schemas.microsoft.com/office/drawing/2018/hyperlinkcolor" showMasterPhAnim="0" showMasterSp="0">
   <p:cSld>
     <p:spTree>
       <p:nvGrpSpPr>
@@ -1297,7 +1297,7 @@
 </file>
 
 <file path=ppt/notesSlides/notesSlide7.xml><?xml version="1.0" encoding="utf-8"?>
-<p:notes xmlns:a="http://schemas.openxmlformats.org/drawingml/2006/main" xmlns:r="http://schemas.openxmlformats.org/officeDocument/2006/relationships" xmlns:mc="http://schemas.openxmlformats.org/markup-compatibility/2006" xmlns:mv="urn:schemas-microsoft-com:mac:vml" xmlns:p="http://schemas.openxmlformats.org/presentationml/2006/main" xmlns:c="http://schemas.openxmlformats.org/drawingml/2006/chart" xmlns:dgm="http://schemas.openxmlformats.org/drawingml/2006/diagram" xmlns:o="urn:schemas-microsoft-com:office:office" xmlns:v="urn:schemas-microsoft-com:vml" xmlns:pvml="urn:schemas-microsoft-com:office:powerpoint" xmlns:com="http://schemas.openxmlformats.org/drawingml/2006/compatibility" xmlns:p14="http://schemas.microsoft.com/office/powerpoint/2010/main" xmlns:p15="http://schemas.microsoft.com/office/powerpoint/2012/main" showMasterPhAnim="0" showMasterSp="0">
+<p:notes xmlns:a="http://schemas.openxmlformats.org/drawingml/2006/main" xmlns:r="http://schemas.openxmlformats.org/officeDocument/2006/relationships" xmlns:mc="http://schemas.openxmlformats.org/markup-compatibility/2006" xmlns:mv="urn:schemas-microsoft-com:mac:vml" xmlns:p="http://schemas.openxmlformats.org/presentationml/2006/main" xmlns:c="http://schemas.openxmlformats.org/drawingml/2006/chart" xmlns:dgm="http://schemas.openxmlformats.org/drawingml/2006/diagram" xmlns:o="urn:schemas-microsoft-com:office:office" xmlns:v="urn:schemas-microsoft-com:vml" xmlns:pvml="urn:schemas-microsoft-com:office:powerpoint" xmlns:com="http://schemas.openxmlformats.org/drawingml/2006/compatibility" xmlns:p14="http://schemas.microsoft.com/office/powerpoint/2010/main" xmlns:p15="http://schemas.microsoft.com/office/powerpoint/2012/main" xmlns:ahyp="http://schemas.microsoft.com/office/drawing/2018/hyperlinkcolor" showMasterPhAnim="0" showMasterSp="0">
   <p:cSld>
     <p:spTree>
       <p:nvGrpSpPr>
@@ -1315,7 +1315,7 @@
       </p:grpSpPr>
       <p:sp>
         <p:nvSpPr>
-          <p:cNvPr id="122" name="Google Shape;122;g8cb6e9acb3_0_6:notes"/>
+          <p:cNvPr id="122" name="Google Shape;122;g8eb12ba7dd_0_0:notes"/>
           <p:cNvSpPr/>
           <p:nvPr>
             <p:ph idx="2" type="sldImg"/>
@@ -1350,7 +1350,7 @@
       </p:sp>
       <p:sp>
         <p:nvSpPr>
-          <p:cNvPr id="123" name="Google Shape;123;g8cb6e9acb3_0_6:notes"/>
+          <p:cNvPr id="123" name="Google Shape;123;g8eb12ba7dd_0_0:notes"/>
           <p:cNvSpPr txBox="1"/>
           <p:nvPr>
             <p:ph idx="1" type="body"/>
@@ -1396,7 +1396,7 @@
 </file>
 
 <file path=ppt/notesSlides/notesSlide8.xml><?xml version="1.0" encoding="utf-8"?>
-<p:notes xmlns:a="http://schemas.openxmlformats.org/drawingml/2006/main" xmlns:r="http://schemas.openxmlformats.org/officeDocument/2006/relationships" xmlns:mc="http://schemas.openxmlformats.org/markup-compatibility/2006" xmlns:mv="urn:schemas-microsoft-com:mac:vml" xmlns:p="http://schemas.openxmlformats.org/presentationml/2006/main" xmlns:c="http://schemas.openxmlformats.org/drawingml/2006/chart" xmlns:dgm="http://schemas.openxmlformats.org/drawingml/2006/diagram" xmlns:o="urn:schemas-microsoft-com:office:office" xmlns:v="urn:schemas-microsoft-com:vml" xmlns:pvml="urn:schemas-microsoft-com:office:powerpoint" xmlns:com="http://schemas.openxmlformats.org/drawingml/2006/compatibility" xmlns:p14="http://schemas.microsoft.com/office/powerpoint/2010/main" xmlns:p15="http://schemas.microsoft.com/office/powerpoint/2012/main" showMasterPhAnim="0" showMasterSp="0">
+<p:notes xmlns:a="http://schemas.openxmlformats.org/drawingml/2006/main" xmlns:r="http://schemas.openxmlformats.org/officeDocument/2006/relationships" xmlns:mc="http://schemas.openxmlformats.org/markup-compatibility/2006" xmlns:mv="urn:schemas-microsoft-com:mac:vml" xmlns:p="http://schemas.openxmlformats.org/presentationml/2006/main" xmlns:c="http://schemas.openxmlformats.org/drawingml/2006/chart" xmlns:dgm="http://schemas.openxmlformats.org/drawingml/2006/diagram" xmlns:o="urn:schemas-microsoft-com:office:office" xmlns:v="urn:schemas-microsoft-com:vml" xmlns:pvml="urn:schemas-microsoft-com:office:powerpoint" xmlns:com="http://schemas.openxmlformats.org/drawingml/2006/compatibility" xmlns:p14="http://schemas.microsoft.com/office/powerpoint/2010/main" xmlns:p15="http://schemas.microsoft.com/office/powerpoint/2012/main" xmlns:ahyp="http://schemas.microsoft.com/office/drawing/2018/hyperlinkcolor" showMasterPhAnim="0" showMasterSp="0">
   <p:cSld>
     <p:spTree>
       <p:nvGrpSpPr>
@@ -1495,7 +1495,7 @@
 </file>
 
 <file path=ppt/slideLayouts/slideLayout1.xml><?xml version="1.0" encoding="utf-8"?>
-<p:sldLayout xmlns:a="http://schemas.openxmlformats.org/drawingml/2006/main" xmlns:r="http://schemas.openxmlformats.org/officeDocument/2006/relationships" xmlns:mc="http://schemas.openxmlformats.org/markup-compatibility/2006" xmlns:mv="urn:schemas-microsoft-com:mac:vml" xmlns:p="http://schemas.openxmlformats.org/presentationml/2006/main" xmlns:c="http://schemas.openxmlformats.org/drawingml/2006/chart" xmlns:dgm="http://schemas.openxmlformats.org/drawingml/2006/diagram" xmlns:o="urn:schemas-microsoft-com:office:office" xmlns:v="urn:schemas-microsoft-com:vml" xmlns:pvml="urn:schemas-microsoft-com:office:powerpoint" xmlns:com="http://schemas.openxmlformats.org/drawingml/2006/compatibility" xmlns:p14="http://schemas.microsoft.com/office/powerpoint/2010/main" xmlns:p15="http://schemas.microsoft.com/office/powerpoint/2012/main" matchingName="Title slide" type="title">
+<p:sldLayout xmlns:a="http://schemas.openxmlformats.org/drawingml/2006/main" xmlns:r="http://schemas.openxmlformats.org/officeDocument/2006/relationships" xmlns:mc="http://schemas.openxmlformats.org/markup-compatibility/2006" xmlns:mv="urn:schemas-microsoft-com:mac:vml" xmlns:p="http://schemas.openxmlformats.org/presentationml/2006/main" xmlns:c="http://schemas.openxmlformats.org/drawingml/2006/chart" xmlns:dgm="http://schemas.openxmlformats.org/drawingml/2006/diagram" xmlns:o="urn:schemas-microsoft-com:office:office" xmlns:v="urn:schemas-microsoft-com:vml" xmlns:pvml="urn:schemas-microsoft-com:office:powerpoint" xmlns:com="http://schemas.openxmlformats.org/drawingml/2006/compatibility" xmlns:p14="http://schemas.microsoft.com/office/powerpoint/2010/main" xmlns:p15="http://schemas.microsoft.com/office/powerpoint/2012/main" xmlns:ahyp="http://schemas.microsoft.com/office/drawing/2018/hyperlinkcolor" matchingName="Title slide" type="title">
   <p:cSld name="TITLE">
     <p:bg>
       <p:bgPr>
@@ -2237,7 +2237,7 @@
 </file>
 
 <file path=ppt/slideLayouts/slideLayout10.xml><?xml version="1.0" encoding="utf-8"?>
-<p:sldLayout xmlns:a="http://schemas.openxmlformats.org/drawingml/2006/main" xmlns:r="http://schemas.openxmlformats.org/officeDocument/2006/relationships" xmlns:mc="http://schemas.openxmlformats.org/markup-compatibility/2006" xmlns:mv="urn:schemas-microsoft-com:mac:vml" xmlns:p="http://schemas.openxmlformats.org/presentationml/2006/main" xmlns:c="http://schemas.openxmlformats.org/drawingml/2006/chart" xmlns:dgm="http://schemas.openxmlformats.org/drawingml/2006/diagram" xmlns:o="urn:schemas-microsoft-com:office:office" xmlns:v="urn:schemas-microsoft-com:vml" xmlns:pvml="urn:schemas-microsoft-com:office:powerpoint" xmlns:com="http://schemas.openxmlformats.org/drawingml/2006/compatibility" xmlns:p14="http://schemas.microsoft.com/office/powerpoint/2010/main" xmlns:p15="http://schemas.microsoft.com/office/powerpoint/2012/main" matchingName="Big number">
+<p:sldLayout xmlns:a="http://schemas.openxmlformats.org/drawingml/2006/main" xmlns:r="http://schemas.openxmlformats.org/officeDocument/2006/relationships" xmlns:mc="http://schemas.openxmlformats.org/markup-compatibility/2006" xmlns:mv="urn:schemas-microsoft-com:mac:vml" xmlns:p="http://schemas.openxmlformats.org/presentationml/2006/main" xmlns:c="http://schemas.openxmlformats.org/drawingml/2006/chart" xmlns:dgm="http://schemas.openxmlformats.org/drawingml/2006/diagram" xmlns:o="urn:schemas-microsoft-com:office:office" xmlns:v="urn:schemas-microsoft-com:vml" xmlns:pvml="urn:schemas-microsoft-com:office:powerpoint" xmlns:com="http://schemas.openxmlformats.org/drawingml/2006/compatibility" xmlns:p14="http://schemas.microsoft.com/office/powerpoint/2010/main" xmlns:p15="http://schemas.microsoft.com/office/powerpoint/2012/main" xmlns:ahyp="http://schemas.microsoft.com/office/drawing/2018/hyperlinkcolor" matchingName="Big number">
   <p:cSld name="BIG_NUMBER">
     <p:bg>
       <p:bgPr>
@@ -2956,7 +2956,7 @@
 </file>
 
 <file path=ppt/slideLayouts/slideLayout11.xml><?xml version="1.0" encoding="utf-8"?>
-<p:sldLayout xmlns:a="http://schemas.openxmlformats.org/drawingml/2006/main" xmlns:r="http://schemas.openxmlformats.org/officeDocument/2006/relationships" xmlns:mc="http://schemas.openxmlformats.org/markup-compatibility/2006" xmlns:mv="urn:schemas-microsoft-com:mac:vml" xmlns:p="http://schemas.openxmlformats.org/presentationml/2006/main" xmlns:c="http://schemas.openxmlformats.org/drawingml/2006/chart" xmlns:dgm="http://schemas.openxmlformats.org/drawingml/2006/diagram" xmlns:o="urn:schemas-microsoft-com:office:office" xmlns:v="urn:schemas-microsoft-com:vml" xmlns:pvml="urn:schemas-microsoft-com:office:powerpoint" xmlns:com="http://schemas.openxmlformats.org/drawingml/2006/compatibility" xmlns:p14="http://schemas.microsoft.com/office/powerpoint/2010/main" xmlns:p15="http://schemas.microsoft.com/office/powerpoint/2012/main" matchingName="Blank" type="blank">
+<p:sldLayout xmlns:a="http://schemas.openxmlformats.org/drawingml/2006/main" xmlns:r="http://schemas.openxmlformats.org/officeDocument/2006/relationships" xmlns:mc="http://schemas.openxmlformats.org/markup-compatibility/2006" xmlns:mv="urn:schemas-microsoft-com:mac:vml" xmlns:p="http://schemas.openxmlformats.org/presentationml/2006/main" xmlns:c="http://schemas.openxmlformats.org/drawingml/2006/chart" xmlns:dgm="http://schemas.openxmlformats.org/drawingml/2006/diagram" xmlns:o="urn:schemas-microsoft-com:office:office" xmlns:v="urn:schemas-microsoft-com:vml" xmlns:pvml="urn:schemas-microsoft-com:office:powerpoint" xmlns:com="http://schemas.openxmlformats.org/drawingml/2006/compatibility" xmlns:p14="http://schemas.microsoft.com/office/powerpoint/2010/main" xmlns:p15="http://schemas.microsoft.com/office/powerpoint/2012/main" xmlns:ahyp="http://schemas.microsoft.com/office/drawing/2018/hyperlinkcolor" matchingName="Blank" type="blank">
   <p:cSld name="BLANK">
     <p:spTree>
       <p:nvGrpSpPr>
@@ -3094,7 +3094,7 @@
 </file>
 
 <file path=ppt/slideLayouts/slideLayout2.xml><?xml version="1.0" encoding="utf-8"?>
-<p:sldLayout xmlns:a="http://schemas.openxmlformats.org/drawingml/2006/main" xmlns:r="http://schemas.openxmlformats.org/officeDocument/2006/relationships" xmlns:mc="http://schemas.openxmlformats.org/markup-compatibility/2006" xmlns:mv="urn:schemas-microsoft-com:mac:vml" xmlns:p="http://schemas.openxmlformats.org/presentationml/2006/main" xmlns:c="http://schemas.openxmlformats.org/drawingml/2006/chart" xmlns:dgm="http://schemas.openxmlformats.org/drawingml/2006/diagram" xmlns:o="urn:schemas-microsoft-com:office:office" xmlns:v="urn:schemas-microsoft-com:vml" xmlns:pvml="urn:schemas-microsoft-com:office:powerpoint" xmlns:com="http://schemas.openxmlformats.org/drawingml/2006/compatibility" xmlns:p14="http://schemas.microsoft.com/office/powerpoint/2010/main" xmlns:p15="http://schemas.microsoft.com/office/powerpoint/2012/main" matchingName="Section header" type="secHead">
+<p:sldLayout xmlns:a="http://schemas.openxmlformats.org/drawingml/2006/main" xmlns:r="http://schemas.openxmlformats.org/officeDocument/2006/relationships" xmlns:mc="http://schemas.openxmlformats.org/markup-compatibility/2006" xmlns:mv="urn:schemas-microsoft-com:mac:vml" xmlns:p="http://schemas.openxmlformats.org/presentationml/2006/main" xmlns:c="http://schemas.openxmlformats.org/drawingml/2006/chart" xmlns:dgm="http://schemas.openxmlformats.org/drawingml/2006/diagram" xmlns:o="urn:schemas-microsoft-com:office:office" xmlns:v="urn:schemas-microsoft-com:vml" xmlns:pvml="urn:schemas-microsoft-com:office:powerpoint" xmlns:com="http://schemas.openxmlformats.org/drawingml/2006/compatibility" xmlns:p14="http://schemas.microsoft.com/office/powerpoint/2010/main" xmlns:p15="http://schemas.microsoft.com/office/powerpoint/2012/main" xmlns:ahyp="http://schemas.microsoft.com/office/drawing/2018/hyperlinkcolor" matchingName="Section header" type="secHead">
   <p:cSld name="SECTION_HEADER">
     <p:bg>
       <p:bgPr>
@@ -3621,7 +3621,7 @@
 </file>
 
 <file path=ppt/slideLayouts/slideLayout3.xml><?xml version="1.0" encoding="utf-8"?>
-<p:sldLayout xmlns:a="http://schemas.openxmlformats.org/drawingml/2006/main" xmlns:r="http://schemas.openxmlformats.org/officeDocument/2006/relationships" xmlns:mc="http://schemas.openxmlformats.org/markup-compatibility/2006" xmlns:mv="urn:schemas-microsoft-com:mac:vml" xmlns:p="http://schemas.openxmlformats.org/presentationml/2006/main" xmlns:c="http://schemas.openxmlformats.org/drawingml/2006/chart" xmlns:dgm="http://schemas.openxmlformats.org/drawingml/2006/diagram" xmlns:o="urn:schemas-microsoft-com:office:office" xmlns:v="urn:schemas-microsoft-com:vml" xmlns:pvml="urn:schemas-microsoft-com:office:powerpoint" xmlns:com="http://schemas.openxmlformats.org/drawingml/2006/compatibility" xmlns:p14="http://schemas.microsoft.com/office/powerpoint/2010/main" xmlns:p15="http://schemas.microsoft.com/office/powerpoint/2012/main" matchingName="Title and body" type="tx">
+<p:sldLayout xmlns:a="http://schemas.openxmlformats.org/drawingml/2006/main" xmlns:r="http://schemas.openxmlformats.org/officeDocument/2006/relationships" xmlns:mc="http://schemas.openxmlformats.org/markup-compatibility/2006" xmlns:mv="urn:schemas-microsoft-com:mac:vml" xmlns:p="http://schemas.openxmlformats.org/presentationml/2006/main" xmlns:c="http://schemas.openxmlformats.org/drawingml/2006/chart" xmlns:dgm="http://schemas.openxmlformats.org/drawingml/2006/diagram" xmlns:o="urn:schemas-microsoft-com:office:office" xmlns:v="urn:schemas-microsoft-com:vml" xmlns:pvml="urn:schemas-microsoft-com:office:powerpoint" xmlns:com="http://schemas.openxmlformats.org/drawingml/2006/compatibility" xmlns:p14="http://schemas.microsoft.com/office/powerpoint/2010/main" xmlns:p15="http://schemas.microsoft.com/office/powerpoint/2012/main" xmlns:ahyp="http://schemas.microsoft.com/office/drawing/2018/hyperlinkcolor" matchingName="Title and body" type="tx">
   <p:cSld name="TITLE_AND_BODY">
     <p:spTree>
       <p:nvGrpSpPr>
@@ -4203,7 +4203,7 @@
 </file>
 
 <file path=ppt/slideLayouts/slideLayout4.xml><?xml version="1.0" encoding="utf-8"?>
-<p:sldLayout xmlns:a="http://schemas.openxmlformats.org/drawingml/2006/main" xmlns:r="http://schemas.openxmlformats.org/officeDocument/2006/relationships" xmlns:mc="http://schemas.openxmlformats.org/markup-compatibility/2006" xmlns:mv="urn:schemas-microsoft-com:mac:vml" xmlns:p="http://schemas.openxmlformats.org/presentationml/2006/main" xmlns:c="http://schemas.openxmlformats.org/drawingml/2006/chart" xmlns:dgm="http://schemas.openxmlformats.org/drawingml/2006/diagram" xmlns:o="urn:schemas-microsoft-com:office:office" xmlns:v="urn:schemas-microsoft-com:vml" xmlns:pvml="urn:schemas-microsoft-com:office:powerpoint" xmlns:com="http://schemas.openxmlformats.org/drawingml/2006/compatibility" xmlns:p14="http://schemas.microsoft.com/office/powerpoint/2010/main" xmlns:p15="http://schemas.microsoft.com/office/powerpoint/2012/main" matchingName="Title and two columns" type="twoColTx">
+<p:sldLayout xmlns:a="http://schemas.openxmlformats.org/drawingml/2006/main" xmlns:r="http://schemas.openxmlformats.org/officeDocument/2006/relationships" xmlns:mc="http://schemas.openxmlformats.org/markup-compatibility/2006" xmlns:mv="urn:schemas-microsoft-com:mac:vml" xmlns:p="http://schemas.openxmlformats.org/presentationml/2006/main" xmlns:c="http://schemas.openxmlformats.org/drawingml/2006/chart" xmlns:dgm="http://schemas.openxmlformats.org/drawingml/2006/diagram" xmlns:o="urn:schemas-microsoft-com:office:office" xmlns:v="urn:schemas-microsoft-com:vml" xmlns:pvml="urn:schemas-microsoft-com:office:powerpoint" xmlns:com="http://schemas.openxmlformats.org/drawingml/2006/compatibility" xmlns:p14="http://schemas.microsoft.com/office/powerpoint/2010/main" xmlns:p15="http://schemas.microsoft.com/office/powerpoint/2012/main" xmlns:ahyp="http://schemas.microsoft.com/office/drawing/2018/hyperlinkcolor" matchingName="Title and two columns" type="twoColTx">
   <p:cSld name="TITLE_AND_TWO_COLUMNS">
     <p:spTree>
       <p:nvGrpSpPr>
@@ -4716,7 +4716,7 @@
 </file>
 
 <file path=ppt/slideLayouts/slideLayout5.xml><?xml version="1.0" encoding="utf-8"?>
-<p:sldLayout xmlns:a="http://schemas.openxmlformats.org/drawingml/2006/main" xmlns:r="http://schemas.openxmlformats.org/officeDocument/2006/relationships" xmlns:mc="http://schemas.openxmlformats.org/markup-compatibility/2006" xmlns:mv="urn:schemas-microsoft-com:mac:vml" xmlns:p="http://schemas.openxmlformats.org/presentationml/2006/main" xmlns:c="http://schemas.openxmlformats.org/drawingml/2006/chart" xmlns:dgm="http://schemas.openxmlformats.org/drawingml/2006/diagram" xmlns:o="urn:schemas-microsoft-com:office:office" xmlns:v="urn:schemas-microsoft-com:vml" xmlns:pvml="urn:schemas-microsoft-com:office:powerpoint" xmlns:com="http://schemas.openxmlformats.org/drawingml/2006/compatibility" xmlns:p14="http://schemas.microsoft.com/office/powerpoint/2010/main" xmlns:p15="http://schemas.microsoft.com/office/powerpoint/2012/main" matchingName="Title only" type="titleOnly">
+<p:sldLayout xmlns:a="http://schemas.openxmlformats.org/drawingml/2006/main" xmlns:r="http://schemas.openxmlformats.org/officeDocument/2006/relationships" xmlns:mc="http://schemas.openxmlformats.org/markup-compatibility/2006" xmlns:mv="urn:schemas-microsoft-com:mac:vml" xmlns:p="http://schemas.openxmlformats.org/presentationml/2006/main" xmlns:c="http://schemas.openxmlformats.org/drawingml/2006/chart" xmlns:dgm="http://schemas.openxmlformats.org/drawingml/2006/diagram" xmlns:o="urn:schemas-microsoft-com:office:office" xmlns:v="urn:schemas-microsoft-com:vml" xmlns:pvml="urn:schemas-microsoft-com:office:powerpoint" xmlns:com="http://schemas.openxmlformats.org/drawingml/2006/compatibility" xmlns:p14="http://schemas.microsoft.com/office/powerpoint/2010/main" xmlns:p15="http://schemas.microsoft.com/office/powerpoint/2012/main" xmlns:ahyp="http://schemas.microsoft.com/office/drawing/2018/hyperlinkcolor" matchingName="Title only" type="titleOnly">
   <p:cSld name="TITLE_ONLY">
     <p:spTree>
       <p:nvGrpSpPr>
@@ -4979,7 +4979,7 @@
 </file>
 
 <file path=ppt/slideLayouts/slideLayout6.xml><?xml version="1.0" encoding="utf-8"?>
-<p:sldLayout xmlns:a="http://schemas.openxmlformats.org/drawingml/2006/main" xmlns:r="http://schemas.openxmlformats.org/officeDocument/2006/relationships" xmlns:mc="http://schemas.openxmlformats.org/markup-compatibility/2006" xmlns:mv="urn:schemas-microsoft-com:mac:vml" xmlns:p="http://schemas.openxmlformats.org/presentationml/2006/main" xmlns:c="http://schemas.openxmlformats.org/drawingml/2006/chart" xmlns:dgm="http://schemas.openxmlformats.org/drawingml/2006/diagram" xmlns:o="urn:schemas-microsoft-com:office:office" xmlns:v="urn:schemas-microsoft-com:vml" xmlns:pvml="urn:schemas-microsoft-com:office:powerpoint" xmlns:com="http://schemas.openxmlformats.org/drawingml/2006/compatibility" xmlns:p14="http://schemas.microsoft.com/office/powerpoint/2010/main" xmlns:p15="http://schemas.microsoft.com/office/powerpoint/2012/main" matchingName="One column text">
+<p:sldLayout xmlns:a="http://schemas.openxmlformats.org/drawingml/2006/main" xmlns:r="http://schemas.openxmlformats.org/officeDocument/2006/relationships" xmlns:mc="http://schemas.openxmlformats.org/markup-compatibility/2006" xmlns:mv="urn:schemas-microsoft-com:mac:vml" xmlns:p="http://schemas.openxmlformats.org/presentationml/2006/main" xmlns:c="http://schemas.openxmlformats.org/drawingml/2006/chart" xmlns:dgm="http://schemas.openxmlformats.org/drawingml/2006/diagram" xmlns:o="urn:schemas-microsoft-com:office:office" xmlns:v="urn:schemas-microsoft-com:vml" xmlns:pvml="urn:schemas-microsoft-com:office:powerpoint" xmlns:com="http://schemas.openxmlformats.org/drawingml/2006/compatibility" xmlns:p14="http://schemas.microsoft.com/office/powerpoint/2010/main" xmlns:p15="http://schemas.microsoft.com/office/powerpoint/2012/main" xmlns:ahyp="http://schemas.microsoft.com/office/drawing/2018/hyperlinkcolor" matchingName="One column text">
   <p:cSld name="ONE_COLUMN_TEXT">
     <p:spTree>
       <p:nvGrpSpPr>
@@ -5367,7 +5367,7 @@
 </file>
 
 <file path=ppt/slideLayouts/slideLayout7.xml><?xml version="1.0" encoding="utf-8"?>
-<p:sldLayout xmlns:a="http://schemas.openxmlformats.org/drawingml/2006/main" xmlns:r="http://schemas.openxmlformats.org/officeDocument/2006/relationships" xmlns:mc="http://schemas.openxmlformats.org/markup-compatibility/2006" xmlns:mv="urn:schemas-microsoft-com:mac:vml" xmlns:p="http://schemas.openxmlformats.org/presentationml/2006/main" xmlns:c="http://schemas.openxmlformats.org/drawingml/2006/chart" xmlns:dgm="http://schemas.openxmlformats.org/drawingml/2006/diagram" xmlns:o="urn:schemas-microsoft-com:office:office" xmlns:v="urn:schemas-microsoft-com:vml" xmlns:pvml="urn:schemas-microsoft-com:office:powerpoint" xmlns:com="http://schemas.openxmlformats.org/drawingml/2006/compatibility" xmlns:p14="http://schemas.microsoft.com/office/powerpoint/2010/main" xmlns:p15="http://schemas.microsoft.com/office/powerpoint/2012/main" matchingName="Main point">
+<p:sldLayout xmlns:a="http://schemas.openxmlformats.org/drawingml/2006/main" xmlns:r="http://schemas.openxmlformats.org/officeDocument/2006/relationships" xmlns:mc="http://schemas.openxmlformats.org/markup-compatibility/2006" xmlns:mv="urn:schemas-microsoft-com:mac:vml" xmlns:p="http://schemas.openxmlformats.org/presentationml/2006/main" xmlns:c="http://schemas.openxmlformats.org/drawingml/2006/chart" xmlns:dgm="http://schemas.openxmlformats.org/drawingml/2006/diagram" xmlns:o="urn:schemas-microsoft-com:office:office" xmlns:v="urn:schemas-microsoft-com:vml" xmlns:pvml="urn:schemas-microsoft-com:office:powerpoint" xmlns:com="http://schemas.openxmlformats.org/drawingml/2006/compatibility" xmlns:p14="http://schemas.microsoft.com/office/powerpoint/2010/main" xmlns:p15="http://schemas.microsoft.com/office/powerpoint/2012/main" xmlns:ahyp="http://schemas.microsoft.com/office/drawing/2018/hyperlinkcolor" matchingName="Main point">
   <p:cSld name="MAIN_POINT">
     <p:bg>
       <p:bgPr>
@@ -5894,7 +5894,7 @@
 </file>
 
 <file path=ppt/slideLayouts/slideLayout8.xml><?xml version="1.0" encoding="utf-8"?>
-<p:sldLayout xmlns:a="http://schemas.openxmlformats.org/drawingml/2006/main" xmlns:r="http://schemas.openxmlformats.org/officeDocument/2006/relationships" xmlns:mc="http://schemas.openxmlformats.org/markup-compatibility/2006" xmlns:mv="urn:schemas-microsoft-com:mac:vml" xmlns:p="http://schemas.openxmlformats.org/presentationml/2006/main" xmlns:c="http://schemas.openxmlformats.org/drawingml/2006/chart" xmlns:dgm="http://schemas.openxmlformats.org/drawingml/2006/diagram" xmlns:o="urn:schemas-microsoft-com:office:office" xmlns:v="urn:schemas-microsoft-com:vml" xmlns:pvml="urn:schemas-microsoft-com:office:powerpoint" xmlns:com="http://schemas.openxmlformats.org/drawingml/2006/compatibility" xmlns:p14="http://schemas.microsoft.com/office/powerpoint/2010/main" xmlns:p15="http://schemas.microsoft.com/office/powerpoint/2012/main" matchingName="Section title and description">
+<p:sldLayout xmlns:a="http://schemas.openxmlformats.org/drawingml/2006/main" xmlns:r="http://schemas.openxmlformats.org/officeDocument/2006/relationships" xmlns:mc="http://schemas.openxmlformats.org/markup-compatibility/2006" xmlns:mv="urn:schemas-microsoft-com:mac:vml" xmlns:p="http://schemas.openxmlformats.org/presentationml/2006/main" xmlns:c="http://schemas.openxmlformats.org/drawingml/2006/chart" xmlns:dgm="http://schemas.openxmlformats.org/drawingml/2006/diagram" xmlns:o="urn:schemas-microsoft-com:office:office" xmlns:v="urn:schemas-microsoft-com:vml" xmlns:pvml="urn:schemas-microsoft-com:office:powerpoint" xmlns:com="http://schemas.openxmlformats.org/drawingml/2006/compatibility" xmlns:p14="http://schemas.microsoft.com/office/powerpoint/2010/main" xmlns:p15="http://schemas.microsoft.com/office/powerpoint/2012/main" xmlns:ahyp="http://schemas.microsoft.com/office/drawing/2018/hyperlinkcolor" matchingName="Section title and description">
   <p:cSld name="SECTION_TITLE_AND_DESCRIPTION">
     <p:spTree>
       <p:nvGrpSpPr>
@@ -6530,7 +6530,7 @@
 </file>
 
 <file path=ppt/slideLayouts/slideLayout9.xml><?xml version="1.0" encoding="utf-8"?>
-<p:sldLayout xmlns:a="http://schemas.openxmlformats.org/drawingml/2006/main" xmlns:r="http://schemas.openxmlformats.org/officeDocument/2006/relationships" xmlns:mc="http://schemas.openxmlformats.org/markup-compatibility/2006" xmlns:mv="urn:schemas-microsoft-com:mac:vml" xmlns:p="http://schemas.openxmlformats.org/presentationml/2006/main" xmlns:c="http://schemas.openxmlformats.org/drawingml/2006/chart" xmlns:dgm="http://schemas.openxmlformats.org/drawingml/2006/diagram" xmlns:o="urn:schemas-microsoft-com:office:office" xmlns:v="urn:schemas-microsoft-com:vml" xmlns:pvml="urn:schemas-microsoft-com:office:powerpoint" xmlns:com="http://schemas.openxmlformats.org/drawingml/2006/compatibility" xmlns:p14="http://schemas.microsoft.com/office/powerpoint/2010/main" xmlns:p15="http://schemas.microsoft.com/office/powerpoint/2012/main" matchingName="Caption">
+<p:sldLayout xmlns:a="http://schemas.openxmlformats.org/drawingml/2006/main" xmlns:r="http://schemas.openxmlformats.org/officeDocument/2006/relationships" xmlns:mc="http://schemas.openxmlformats.org/markup-compatibility/2006" xmlns:mv="urn:schemas-microsoft-com:mac:vml" xmlns:p="http://schemas.openxmlformats.org/presentationml/2006/main" xmlns:c="http://schemas.openxmlformats.org/drawingml/2006/chart" xmlns:dgm="http://schemas.openxmlformats.org/drawingml/2006/diagram" xmlns:o="urn:schemas-microsoft-com:office:office" xmlns:v="urn:schemas-microsoft-com:vml" xmlns:pvml="urn:schemas-microsoft-com:office:powerpoint" xmlns:com="http://schemas.openxmlformats.org/drawingml/2006/compatibility" xmlns:p14="http://schemas.microsoft.com/office/powerpoint/2010/main" xmlns:p15="http://schemas.microsoft.com/office/powerpoint/2012/main" xmlns:ahyp="http://schemas.microsoft.com/office/drawing/2018/hyperlinkcolor" matchingName="Caption">
   <p:cSld name="CAPTION_ONLY">
     <p:spTree>
       <p:nvGrpSpPr>
@@ -6708,7 +6708,7 @@
 </file>
 
 <file path=ppt/slideMasters/slideMaster1.xml><?xml version="1.0" encoding="utf-8"?>
-<p:sldMaster xmlns:a="http://schemas.openxmlformats.org/drawingml/2006/main" xmlns:r="http://schemas.openxmlformats.org/officeDocument/2006/relationships" xmlns:mc="http://schemas.openxmlformats.org/markup-compatibility/2006" xmlns:mv="urn:schemas-microsoft-com:mac:vml" xmlns:p="http://schemas.openxmlformats.org/presentationml/2006/main" xmlns:c="http://schemas.openxmlformats.org/drawingml/2006/chart" xmlns:dgm="http://schemas.openxmlformats.org/drawingml/2006/diagram" xmlns:o="urn:schemas-microsoft-com:office:office" xmlns:v="urn:schemas-microsoft-com:vml" xmlns:pvml="urn:schemas-microsoft-com:office:powerpoint" xmlns:com="http://schemas.openxmlformats.org/drawingml/2006/compatibility" xmlns:p14="http://schemas.microsoft.com/office/powerpoint/2010/main" xmlns:p15="http://schemas.microsoft.com/office/powerpoint/2012/main">
+<p:sldMaster xmlns:a="http://schemas.openxmlformats.org/drawingml/2006/main" xmlns:r="http://schemas.openxmlformats.org/officeDocument/2006/relationships" xmlns:mc="http://schemas.openxmlformats.org/markup-compatibility/2006" xmlns:mv="urn:schemas-microsoft-com:mac:vml" xmlns:p="http://schemas.openxmlformats.org/presentationml/2006/main" xmlns:c="http://schemas.openxmlformats.org/drawingml/2006/chart" xmlns:dgm="http://schemas.openxmlformats.org/drawingml/2006/diagram" xmlns:o="urn:schemas-microsoft-com:office:office" xmlns:v="urn:schemas-microsoft-com:vml" xmlns:pvml="urn:schemas-microsoft-com:office:powerpoint" xmlns:com="http://schemas.openxmlformats.org/drawingml/2006/compatibility" xmlns:p14="http://schemas.microsoft.com/office/powerpoint/2010/main" xmlns:p15="http://schemas.microsoft.com/office/powerpoint/2012/main" xmlns:ahyp="http://schemas.microsoft.com/office/drawing/2018/hyperlinkcolor">
   <p:cSld name="geometric">
     <p:bg>
       <p:bgPr>
@@ -8095,7 +8095,7 @@
 </file>
 
 <file path=ppt/slides/slide1.xml><?xml version="1.0" encoding="utf-8"?>
-<p:sld xmlns:a="http://schemas.openxmlformats.org/drawingml/2006/main" xmlns:r="http://schemas.openxmlformats.org/officeDocument/2006/relationships" xmlns:mc="http://schemas.openxmlformats.org/markup-compatibility/2006" xmlns:mv="urn:schemas-microsoft-com:mac:vml" xmlns:p="http://schemas.openxmlformats.org/presentationml/2006/main" xmlns:c="http://schemas.openxmlformats.org/drawingml/2006/chart" xmlns:dgm="http://schemas.openxmlformats.org/drawingml/2006/diagram" xmlns:o="urn:schemas-microsoft-com:office:office" xmlns:v="urn:schemas-microsoft-com:vml" xmlns:pvml="urn:schemas-microsoft-com:office:powerpoint" xmlns:com="http://schemas.openxmlformats.org/drawingml/2006/compatibility" xmlns:p14="http://schemas.microsoft.com/office/powerpoint/2010/main" xmlns:p15="http://schemas.microsoft.com/office/powerpoint/2012/main">
+<p:sld xmlns:a="http://schemas.openxmlformats.org/drawingml/2006/main" xmlns:r="http://schemas.openxmlformats.org/officeDocument/2006/relationships" xmlns:mc="http://schemas.openxmlformats.org/markup-compatibility/2006" xmlns:mv="urn:schemas-microsoft-com:mac:vml" xmlns:p="http://schemas.openxmlformats.org/presentationml/2006/main" xmlns:c="http://schemas.openxmlformats.org/drawingml/2006/chart" xmlns:dgm="http://schemas.openxmlformats.org/drawingml/2006/diagram" xmlns:o="urn:schemas-microsoft-com:office:office" xmlns:v="urn:schemas-microsoft-com:vml" xmlns:pvml="urn:schemas-microsoft-com:office:powerpoint" xmlns:com="http://schemas.openxmlformats.org/drawingml/2006/compatibility" xmlns:p14="http://schemas.microsoft.com/office/powerpoint/2010/main" xmlns:p15="http://schemas.microsoft.com/office/powerpoint/2012/main" xmlns:ahyp="http://schemas.microsoft.com/office/drawing/2018/hyperlinkcolor">
   <p:cSld>
     <p:spTree>
       <p:nvGrpSpPr>
@@ -8238,7 +8238,7 @@
 </file>
 
 <file path=ppt/slides/slide2.xml><?xml version="1.0" encoding="utf-8"?>
-<p:sld xmlns:a="http://schemas.openxmlformats.org/drawingml/2006/main" xmlns:r="http://schemas.openxmlformats.org/officeDocument/2006/relationships" xmlns:mc="http://schemas.openxmlformats.org/markup-compatibility/2006" xmlns:mv="urn:schemas-microsoft-com:mac:vml" xmlns:p="http://schemas.openxmlformats.org/presentationml/2006/main" xmlns:c="http://schemas.openxmlformats.org/drawingml/2006/chart" xmlns:dgm="http://schemas.openxmlformats.org/drawingml/2006/diagram" xmlns:o="urn:schemas-microsoft-com:office:office" xmlns:v="urn:schemas-microsoft-com:vml" xmlns:pvml="urn:schemas-microsoft-com:office:powerpoint" xmlns:com="http://schemas.openxmlformats.org/drawingml/2006/compatibility" xmlns:p14="http://schemas.microsoft.com/office/powerpoint/2010/main" xmlns:p15="http://schemas.microsoft.com/office/powerpoint/2012/main">
+<p:sld xmlns:a="http://schemas.openxmlformats.org/drawingml/2006/main" xmlns:r="http://schemas.openxmlformats.org/officeDocument/2006/relationships" xmlns:mc="http://schemas.openxmlformats.org/markup-compatibility/2006" xmlns:mv="urn:schemas-microsoft-com:mac:vml" xmlns:p="http://schemas.openxmlformats.org/presentationml/2006/main" xmlns:c="http://schemas.openxmlformats.org/drawingml/2006/chart" xmlns:dgm="http://schemas.openxmlformats.org/drawingml/2006/diagram" xmlns:o="urn:schemas-microsoft-com:office:office" xmlns:v="urn:schemas-microsoft-com:vml" xmlns:pvml="urn:schemas-microsoft-com:office:powerpoint" xmlns:com="http://schemas.openxmlformats.org/drawingml/2006/compatibility" xmlns:p14="http://schemas.microsoft.com/office/powerpoint/2010/main" xmlns:p15="http://schemas.microsoft.com/office/powerpoint/2012/main" xmlns:ahyp="http://schemas.microsoft.com/office/drawing/2018/hyperlinkcolor">
   <p:cSld>
     <p:spTree>
       <p:nvGrpSpPr>
@@ -8649,7 +8649,7 @@
 </file>
 
 <file path=ppt/slides/slide3.xml><?xml version="1.0" encoding="utf-8"?>
-<p:sld xmlns:a="http://schemas.openxmlformats.org/drawingml/2006/main" xmlns:r="http://schemas.openxmlformats.org/officeDocument/2006/relationships" xmlns:mc="http://schemas.openxmlformats.org/markup-compatibility/2006" xmlns:mv="urn:schemas-microsoft-com:mac:vml" xmlns:p="http://schemas.openxmlformats.org/presentationml/2006/main" xmlns:c="http://schemas.openxmlformats.org/drawingml/2006/chart" xmlns:dgm="http://schemas.openxmlformats.org/drawingml/2006/diagram" xmlns:o="urn:schemas-microsoft-com:office:office" xmlns:v="urn:schemas-microsoft-com:vml" xmlns:pvml="urn:schemas-microsoft-com:office:powerpoint" xmlns:com="http://schemas.openxmlformats.org/drawingml/2006/compatibility" xmlns:p14="http://schemas.microsoft.com/office/powerpoint/2010/main" xmlns:p15="http://schemas.microsoft.com/office/powerpoint/2012/main">
+<p:sld xmlns:a="http://schemas.openxmlformats.org/drawingml/2006/main" xmlns:r="http://schemas.openxmlformats.org/officeDocument/2006/relationships" xmlns:mc="http://schemas.openxmlformats.org/markup-compatibility/2006" xmlns:mv="urn:schemas-microsoft-com:mac:vml" xmlns:p="http://schemas.openxmlformats.org/presentationml/2006/main" xmlns:c="http://schemas.openxmlformats.org/drawingml/2006/chart" xmlns:dgm="http://schemas.openxmlformats.org/drawingml/2006/diagram" xmlns:o="urn:schemas-microsoft-com:office:office" xmlns:v="urn:schemas-microsoft-com:vml" xmlns:pvml="urn:schemas-microsoft-com:office:powerpoint" xmlns:com="http://schemas.openxmlformats.org/drawingml/2006/compatibility" xmlns:p14="http://schemas.microsoft.com/office/powerpoint/2010/main" xmlns:p15="http://schemas.microsoft.com/office/powerpoint/2012/main" xmlns:ahyp="http://schemas.microsoft.com/office/drawing/2018/hyperlinkcolor">
   <p:cSld>
     <p:spTree>
       <p:nvGrpSpPr>
@@ -8821,7 +8821,7 @@
                 <a:cs typeface="Liberation Serif"/>
                 <a:sym typeface="Liberation Serif"/>
               </a:rPr>
-              <a:t> and very likely to fall under </a:t>
+              <a:t> and most likely falls under </a:t>
             </a:r>
             <a:r>
               <a:rPr b="1" lang="en" sz="2000">
@@ -8963,7 +8963,7 @@
         </p:blipFill>
         <p:spPr>
           <a:xfrm>
-            <a:off x="6658125" y="2323275"/>
+            <a:off x="6969825" y="5236675"/>
             <a:ext cx="2174176" cy="2174176"/>
           </a:xfrm>
           <a:prstGeom prst="rect">
@@ -8984,7 +8984,7 @@
 </file>
 
 <file path=ppt/slides/slide4.xml><?xml version="1.0" encoding="utf-8"?>
-<p:sld xmlns:a="http://schemas.openxmlformats.org/drawingml/2006/main" xmlns:r="http://schemas.openxmlformats.org/officeDocument/2006/relationships" xmlns:mc="http://schemas.openxmlformats.org/markup-compatibility/2006" xmlns:mv="urn:schemas-microsoft-com:mac:vml" xmlns:p="http://schemas.openxmlformats.org/presentationml/2006/main" xmlns:c="http://schemas.openxmlformats.org/drawingml/2006/chart" xmlns:dgm="http://schemas.openxmlformats.org/drawingml/2006/diagram" xmlns:o="urn:schemas-microsoft-com:office:office" xmlns:v="urn:schemas-microsoft-com:vml" xmlns:pvml="urn:schemas-microsoft-com:office:powerpoint" xmlns:com="http://schemas.openxmlformats.org/drawingml/2006/compatibility" xmlns:p14="http://schemas.microsoft.com/office/powerpoint/2010/main" xmlns:p15="http://schemas.microsoft.com/office/powerpoint/2012/main">
+<p:sld xmlns:a="http://schemas.openxmlformats.org/drawingml/2006/main" xmlns:r="http://schemas.openxmlformats.org/officeDocument/2006/relationships" xmlns:mc="http://schemas.openxmlformats.org/markup-compatibility/2006" xmlns:mv="urn:schemas-microsoft-com:mac:vml" xmlns:p="http://schemas.openxmlformats.org/presentationml/2006/main" xmlns:c="http://schemas.openxmlformats.org/drawingml/2006/chart" xmlns:dgm="http://schemas.openxmlformats.org/drawingml/2006/diagram" xmlns:o="urn:schemas-microsoft-com:office:office" xmlns:v="urn:schemas-microsoft-com:vml" xmlns:pvml="urn:schemas-microsoft-com:office:powerpoint" xmlns:com="http://schemas.openxmlformats.org/drawingml/2006/compatibility" xmlns:p14="http://schemas.microsoft.com/office/powerpoint/2010/main" xmlns:p15="http://schemas.microsoft.com/office/powerpoint/2012/main" xmlns:ahyp="http://schemas.microsoft.com/office/drawing/2018/hyperlinkcolor">
   <p:cSld>
     <p:spTree>
       <p:nvGrpSpPr>
@@ -9361,7 +9361,7 @@
 </file>
 
 <file path=ppt/slides/slide5.xml><?xml version="1.0" encoding="utf-8"?>
-<p:sld xmlns:a="http://schemas.openxmlformats.org/drawingml/2006/main" xmlns:r="http://schemas.openxmlformats.org/officeDocument/2006/relationships" xmlns:mc="http://schemas.openxmlformats.org/markup-compatibility/2006" xmlns:mv="urn:schemas-microsoft-com:mac:vml" xmlns:p="http://schemas.openxmlformats.org/presentationml/2006/main" xmlns:c="http://schemas.openxmlformats.org/drawingml/2006/chart" xmlns:dgm="http://schemas.openxmlformats.org/drawingml/2006/diagram" xmlns:o="urn:schemas-microsoft-com:office:office" xmlns:v="urn:schemas-microsoft-com:vml" xmlns:pvml="urn:schemas-microsoft-com:office:powerpoint" xmlns:com="http://schemas.openxmlformats.org/drawingml/2006/compatibility" xmlns:p14="http://schemas.microsoft.com/office/powerpoint/2010/main" xmlns:p15="http://schemas.microsoft.com/office/powerpoint/2012/main">
+<p:sld xmlns:a="http://schemas.openxmlformats.org/drawingml/2006/main" xmlns:r="http://schemas.openxmlformats.org/officeDocument/2006/relationships" xmlns:mc="http://schemas.openxmlformats.org/markup-compatibility/2006" xmlns:mv="urn:schemas-microsoft-com:mac:vml" xmlns:p="http://schemas.openxmlformats.org/presentationml/2006/main" xmlns:c="http://schemas.openxmlformats.org/drawingml/2006/chart" xmlns:dgm="http://schemas.openxmlformats.org/drawingml/2006/diagram" xmlns:o="urn:schemas-microsoft-com:office:office" xmlns:v="urn:schemas-microsoft-com:vml" xmlns:pvml="urn:schemas-microsoft-com:office:powerpoint" xmlns:com="http://schemas.openxmlformats.org/drawingml/2006/compatibility" xmlns:p14="http://schemas.microsoft.com/office/powerpoint/2010/main" xmlns:p15="http://schemas.microsoft.com/office/powerpoint/2012/main" xmlns:ahyp="http://schemas.microsoft.com/office/drawing/2018/hyperlinkcolor">
   <p:cSld>
     <p:spTree>
       <p:nvGrpSpPr>
@@ -9740,7 +9740,7 @@
 </file>
 
 <file path=ppt/slides/slide6.xml><?xml version="1.0" encoding="utf-8"?>
-<p:sld xmlns:a="http://schemas.openxmlformats.org/drawingml/2006/main" xmlns:r="http://schemas.openxmlformats.org/officeDocument/2006/relationships" xmlns:mc="http://schemas.openxmlformats.org/markup-compatibility/2006" xmlns:mv="urn:schemas-microsoft-com:mac:vml" xmlns:p="http://schemas.openxmlformats.org/presentationml/2006/main" xmlns:c="http://schemas.openxmlformats.org/drawingml/2006/chart" xmlns:dgm="http://schemas.openxmlformats.org/drawingml/2006/diagram" xmlns:o="urn:schemas-microsoft-com:office:office" xmlns:v="urn:schemas-microsoft-com:vml" xmlns:pvml="urn:schemas-microsoft-com:office:powerpoint" xmlns:com="http://schemas.openxmlformats.org/drawingml/2006/compatibility" xmlns:p14="http://schemas.microsoft.com/office/powerpoint/2010/main" xmlns:p15="http://schemas.microsoft.com/office/powerpoint/2012/main">
+<p:sld xmlns:a="http://schemas.openxmlformats.org/drawingml/2006/main" xmlns:r="http://schemas.openxmlformats.org/officeDocument/2006/relationships" xmlns:mc="http://schemas.openxmlformats.org/markup-compatibility/2006" xmlns:mv="urn:schemas-microsoft-com:mac:vml" xmlns:p="http://schemas.openxmlformats.org/presentationml/2006/main" xmlns:c="http://schemas.openxmlformats.org/drawingml/2006/chart" xmlns:dgm="http://schemas.openxmlformats.org/drawingml/2006/diagram" xmlns:o="urn:schemas-microsoft-com:office:office" xmlns:v="urn:schemas-microsoft-com:vml" xmlns:pvml="urn:schemas-microsoft-com:office:powerpoint" xmlns:com="http://schemas.openxmlformats.org/drawingml/2006/compatibility" xmlns:p14="http://schemas.microsoft.com/office/powerpoint/2010/main" xmlns:p15="http://schemas.microsoft.com/office/powerpoint/2012/main" xmlns:ahyp="http://schemas.microsoft.com/office/drawing/2018/hyperlinkcolor">
   <p:cSld>
     <p:spTree>
       <p:nvGrpSpPr>
@@ -9861,7 +9861,7 @@
 </file>
 
 <file path=ppt/slides/slide7.xml><?xml version="1.0" encoding="utf-8"?>
-<p:sld xmlns:a="http://schemas.openxmlformats.org/drawingml/2006/main" xmlns:r="http://schemas.openxmlformats.org/officeDocument/2006/relationships" xmlns:mc="http://schemas.openxmlformats.org/markup-compatibility/2006" xmlns:mv="urn:schemas-microsoft-com:mac:vml" xmlns:p="http://schemas.openxmlformats.org/presentationml/2006/main" xmlns:c="http://schemas.openxmlformats.org/drawingml/2006/chart" xmlns:dgm="http://schemas.openxmlformats.org/drawingml/2006/diagram" xmlns:o="urn:schemas-microsoft-com:office:office" xmlns:v="urn:schemas-microsoft-com:vml" xmlns:pvml="urn:schemas-microsoft-com:office:powerpoint" xmlns:com="http://schemas.openxmlformats.org/drawingml/2006/compatibility" xmlns:p14="http://schemas.microsoft.com/office/powerpoint/2010/main" xmlns:p15="http://schemas.microsoft.com/office/powerpoint/2012/main">
+<p:sld xmlns:a="http://schemas.openxmlformats.org/drawingml/2006/main" xmlns:r="http://schemas.openxmlformats.org/officeDocument/2006/relationships" xmlns:mc="http://schemas.openxmlformats.org/markup-compatibility/2006" xmlns:mv="urn:schemas-microsoft-com:mac:vml" xmlns:p="http://schemas.openxmlformats.org/presentationml/2006/main" xmlns:c="http://schemas.openxmlformats.org/drawingml/2006/chart" xmlns:dgm="http://schemas.openxmlformats.org/drawingml/2006/diagram" xmlns:o="urn:schemas-microsoft-com:office:office" xmlns:v="urn:schemas-microsoft-com:vml" xmlns:pvml="urn:schemas-microsoft-com:office:powerpoint" xmlns:com="http://schemas.openxmlformats.org/drawingml/2006/compatibility" xmlns:p14="http://schemas.microsoft.com/office/powerpoint/2010/main" xmlns:p15="http://schemas.microsoft.com/office/powerpoint/2012/main" xmlns:ahyp="http://schemas.microsoft.com/office/drawing/2018/hyperlinkcolor">
   <p:cSld>
     <p:spTree>
       <p:nvGrpSpPr>
@@ -9882,13 +9882,13 @@
           <p:cNvPr id="125" name="Google Shape;125;p19"/>
           <p:cNvSpPr txBox="1"/>
           <p:nvPr>
-            <p:ph type="title"/>
+            <p:ph idx="1" type="body"/>
           </p:nvPr>
         </p:nvSpPr>
         <p:spPr>
           <a:xfrm>
-            <a:off x="311700" y="410000"/>
-            <a:ext cx="8520600" cy="607800"/>
+            <a:off x="3157100" y="1876425"/>
+            <a:ext cx="5675100" cy="2692500"/>
           </a:xfrm>
           <a:prstGeom prst="rect">
             <a:avLst/>
@@ -9910,41 +9910,24 @@
               <a:buNone/>
             </a:pPr>
             <a:r>
+              <a:rPr lang="en" u="sng">
+                <a:solidFill>
+                  <a:schemeClr val="hlink"/>
+                </a:solidFill>
+                <a:hlinkClick r:id="rId3"/>
+              </a:rPr>
+              <a:t>Khan</a:t>
+            </a:r>
+            <a:r>
               <a:rPr lang="en"/>
-              <a:t>UNIT PLAN: SQL</a:t>
+              <a:t> offers 4 sub-units on SQL.</a:t>
             </a:r>
             <a:endParaRPr/>
           </a:p>
-        </p:txBody>
-      </p:sp>
-      <p:sp>
-        <p:nvSpPr>
-          <p:cNvPr id="126" name="Google Shape;126;p19">
-            <a:hlinkClick r:id="rId3"/>
-          </p:cNvPr>
-          <p:cNvSpPr txBox="1"/>
-          <p:nvPr>
-            <p:ph idx="1" type="body"/>
-          </p:nvPr>
-        </p:nvSpPr>
-        <p:spPr>
-          <a:xfrm>
-            <a:off x="311700" y="1229875"/>
-            <a:ext cx="8520600" cy="3339000"/>
-          </a:xfrm>
-          <a:prstGeom prst="rect">
-            <a:avLst/>
-          </a:prstGeom>
-        </p:spPr>
-        <p:txBody>
-          <a:bodyPr anchorCtr="0" anchor="t" bIns="91425" lIns="91425" spcFirstLastPara="1" rIns="91425" wrap="square" tIns="91425">
-            <a:noAutofit/>
-          </a:bodyPr>
-          <a:lstStyle/>
           <a:p>
             <a:pPr indent="0" lvl="0" marL="0" rtl="0" algn="l">
               <a:spcBef>
-                <a:spcPts val="0"/>
+                <a:spcPts val="1600"/>
               </a:spcBef>
               <a:spcAft>
                 <a:spcPts val="1600"/>
@@ -9953,7 +9936,7 @@
             </a:pPr>
             <a:r>
               <a:rPr lang="en"/>
-              <a:t>Use </a:t>
+              <a:t>You don’t have to cover them all.</a:t>
             </a:r>
             <a:endParaRPr/>
           </a:p>
@@ -9961,12 +9944,14 @@
       </p:sp>
       <p:pic>
         <p:nvPicPr>
-          <p:cNvPr id="127" name="Google Shape;127;p19"/>
+          <p:cNvPr id="126" name="Google Shape;126;p19">
+            <a:hlinkClick r:id="rId4"/>
+          </p:cNvPr>
           <p:cNvPicPr preferRelativeResize="0"/>
           <p:nvPr/>
         </p:nvPicPr>
         <p:blipFill>
-          <a:blip r:embed="rId4">
+          <a:blip r:embed="rId5">
             <a:alphaModFix/>
           </a:blip>
           <a:stretch>
@@ -9975,8 +9960,36 @@
         </p:blipFill>
         <p:spPr>
           <a:xfrm>
-            <a:off x="1064513" y="1229863"/>
+            <a:off x="338125" y="-12"/>
             <a:ext cx="6791325" cy="1876425"/>
+          </a:xfrm>
+          <a:prstGeom prst="rect">
+            <a:avLst/>
+          </a:prstGeom>
+          <a:noFill/>
+          <a:ln>
+            <a:noFill/>
+          </a:ln>
+        </p:spPr>
+      </p:pic>
+      <p:pic>
+        <p:nvPicPr>
+          <p:cNvPr id="127" name="Google Shape;127;p19"/>
+          <p:cNvPicPr preferRelativeResize="0"/>
+          <p:nvPr/>
+        </p:nvPicPr>
+        <p:blipFill>
+          <a:blip r:embed="rId6">
+            <a:alphaModFix/>
+          </a:blip>
+          <a:stretch>
+            <a:fillRect/>
+          </a:stretch>
+        </p:blipFill>
+        <p:spPr>
+          <a:xfrm>
+            <a:off x="338125" y="1876425"/>
+            <a:ext cx="2818975" cy="2928250"/>
           </a:xfrm>
           <a:prstGeom prst="rect">
             <a:avLst/>
@@ -9995,19 +10008,25 @@
         </p:nvSpPr>
         <p:spPr>
           <a:xfrm>
-            <a:off x="1130575" y="3541125"/>
-            <a:ext cx="6336300" cy="521400"/>
+            <a:off x="503400" y="2978325"/>
+            <a:ext cx="2466300" cy="1442400"/>
           </a:xfrm>
           <a:prstGeom prst="rect">
             <a:avLst/>
           </a:prstGeom>
           <a:noFill/>
-          <a:ln>
-            <a:noFill/>
+          <a:ln cap="flat" cmpd="sng" w="9525">
+            <a:solidFill>
+              <a:srgbClr val="FF0000"/>
+            </a:solidFill>
+            <a:prstDash val="solid"/>
+            <a:round/>
+            <a:headEnd len="sm" w="sm" type="none"/>
+            <a:tailEnd len="sm" w="sm" type="none"/>
           </a:ln>
         </p:spPr>
         <p:txBody>
-          <a:bodyPr anchorCtr="0" anchor="ctr" bIns="91425" lIns="91425" spcFirstLastPara="1" rIns="91425" wrap="square" tIns="91425">
+          <a:bodyPr anchorCtr="0" anchor="t" bIns="91425" lIns="91425" spcFirstLastPara="1" rIns="91425" wrap="square" tIns="91425">
             <a:noAutofit/>
           </a:bodyPr>
           <a:lstStyle/>
@@ -10022,15 +10041,14 @@
               <a:buNone/>
             </a:pPr>
             <a:r>
-              <a:rPr lang="en" sz="1100" u="sng">
-                <a:solidFill>
-                  <a:schemeClr val="hlink"/>
-                </a:solidFill>
-                <a:hlinkClick r:id="rId5"/>
-              </a:rPr>
-              <a:t>Khan Academy - SQL</a:t>
+              <a:t/>
             </a:r>
-            <a:endParaRPr/>
+            <a:endParaRPr>
+              <a:latin typeface="Roboto"/>
+              <a:ea typeface="Roboto"/>
+              <a:cs typeface="Roboto"/>
+              <a:sym typeface="Roboto"/>
+            </a:endParaRPr>
           </a:p>
         </p:txBody>
       </p:sp>
@@ -10043,7 +10061,7 @@
 </file>
 
 <file path=ppt/slides/slide8.xml><?xml version="1.0" encoding="utf-8"?>
-<p:sld xmlns:a="http://schemas.openxmlformats.org/drawingml/2006/main" xmlns:r="http://schemas.openxmlformats.org/officeDocument/2006/relationships" xmlns:mc="http://schemas.openxmlformats.org/markup-compatibility/2006" xmlns:mv="urn:schemas-microsoft-com:mac:vml" xmlns:p="http://schemas.openxmlformats.org/presentationml/2006/main" xmlns:c="http://schemas.openxmlformats.org/drawingml/2006/chart" xmlns:dgm="http://schemas.openxmlformats.org/drawingml/2006/diagram" xmlns:o="urn:schemas-microsoft-com:office:office" xmlns:v="urn:schemas-microsoft-com:vml" xmlns:pvml="urn:schemas-microsoft-com:office:powerpoint" xmlns:com="http://schemas.openxmlformats.org/drawingml/2006/compatibility" xmlns:p14="http://schemas.microsoft.com/office/powerpoint/2010/main" xmlns:p15="http://schemas.microsoft.com/office/powerpoint/2012/main">
+<p:sld xmlns:a="http://schemas.openxmlformats.org/drawingml/2006/main" xmlns:r="http://schemas.openxmlformats.org/officeDocument/2006/relationships" xmlns:mc="http://schemas.openxmlformats.org/markup-compatibility/2006" xmlns:mv="urn:schemas-microsoft-com:mac:vml" xmlns:p="http://schemas.openxmlformats.org/presentationml/2006/main" xmlns:c="http://schemas.openxmlformats.org/drawingml/2006/chart" xmlns:dgm="http://schemas.openxmlformats.org/drawingml/2006/diagram" xmlns:o="urn:schemas-microsoft-com:office:office" xmlns:v="urn:schemas-microsoft-com:vml" xmlns:pvml="urn:schemas-microsoft-com:office:powerpoint" xmlns:com="http://schemas.openxmlformats.org/drawingml/2006/compatibility" xmlns:p14="http://schemas.microsoft.com/office/powerpoint/2010/main" xmlns:p15="http://schemas.microsoft.com/office/powerpoint/2012/main" xmlns:ahyp="http://schemas.microsoft.com/office/drawing/2018/hyperlinkcolor">
   <p:cSld>
     <p:spTree>
       <p:nvGrpSpPr>
@@ -10110,7 +10128,7 @@
         <p:spPr>
           <a:xfrm>
             <a:off x="311700" y="1017800"/>
-            <a:ext cx="5067900" cy="3538800"/>
+            <a:ext cx="6423000" cy="3538800"/>
           </a:xfrm>
           <a:prstGeom prst="rect">
             <a:avLst/>
@@ -10127,13 +10145,29 @@
                 <a:spcPts val="0"/>
               </a:spcBef>
               <a:spcAft>
-                <a:spcPts val="1600"/>
+                <a:spcPts val="0"/>
               </a:spcAft>
               <a:buNone/>
             </a:pPr>
             <a:r>
               <a:rPr lang="en"/>
-              <a:t>We recommend dividing in 2 challenges a day.</a:t>
+              <a:t>Each lesson is a video followed by an assignment.</a:t>
+            </a:r>
+            <a:endParaRPr/>
+          </a:p>
+          <a:p>
+            <a:pPr indent="0" lvl="0" marL="0" rtl="0" algn="l">
+              <a:spcBef>
+                <a:spcPts val="1600"/>
+              </a:spcBef>
+              <a:spcAft>
+                <a:spcPts val="1600"/>
+              </a:spcAft>
+              <a:buNone/>
+            </a:pPr>
+            <a:r>
+              <a:rPr lang="en"/>
+              <a:t>We recommend assigning up to 2 “challenges” a day.</a:t>
             </a:r>
             <a:endParaRPr/>
           </a:p>
@@ -10155,8 +10189,8 @@
         </p:blipFill>
         <p:spPr>
           <a:xfrm>
-            <a:off x="2560625" y="1494200"/>
-            <a:ext cx="2818975" cy="2928250"/>
+            <a:off x="7185505" y="0"/>
+            <a:ext cx="1646791" cy="5143501"/>
           </a:xfrm>
           <a:prstGeom prst="rect">
             <a:avLst/>
@@ -10167,6 +10201,110 @@
           </a:ln>
         </p:spPr>
       </p:pic>
+      <p:sp>
+        <p:nvSpPr>
+          <p:cNvPr id="136" name="Google Shape;136;p20"/>
+          <p:cNvSpPr txBox="1"/>
+          <p:nvPr/>
+        </p:nvSpPr>
+        <p:spPr>
+          <a:xfrm>
+            <a:off x="7015875" y="454675"/>
+            <a:ext cx="1977900" cy="973800"/>
+          </a:xfrm>
+          <a:prstGeom prst="rect">
+            <a:avLst/>
+          </a:prstGeom>
+          <a:noFill/>
+          <a:ln cap="flat" cmpd="sng" w="9525">
+            <a:solidFill>
+              <a:srgbClr val="FF0000"/>
+            </a:solidFill>
+            <a:prstDash val="solid"/>
+            <a:round/>
+            <a:headEnd len="sm" w="sm" type="none"/>
+            <a:tailEnd len="sm" w="sm" type="none"/>
+          </a:ln>
+        </p:spPr>
+        <p:txBody>
+          <a:bodyPr anchorCtr="0" anchor="t" bIns="91425" lIns="91425" spcFirstLastPara="1" rIns="91425" wrap="square" tIns="91425">
+            <a:noAutofit/>
+          </a:bodyPr>
+          <a:lstStyle/>
+          <a:p>
+            <a:pPr indent="0" lvl="0" marL="0" rtl="0" algn="l">
+              <a:spcBef>
+                <a:spcPts val="0"/>
+              </a:spcBef>
+              <a:spcAft>
+                <a:spcPts val="0"/>
+              </a:spcAft>
+              <a:buNone/>
+            </a:pPr>
+            <a:r>
+              <a:t/>
+            </a:r>
+            <a:endParaRPr>
+              <a:latin typeface="Roboto"/>
+              <a:ea typeface="Roboto"/>
+              <a:cs typeface="Roboto"/>
+              <a:sym typeface="Roboto"/>
+            </a:endParaRPr>
+          </a:p>
+        </p:txBody>
+      </p:sp>
+      <p:sp>
+        <p:nvSpPr>
+          <p:cNvPr id="137" name="Google Shape;137;p20"/>
+          <p:cNvSpPr txBox="1"/>
+          <p:nvPr/>
+        </p:nvSpPr>
+        <p:spPr>
+          <a:xfrm>
+            <a:off x="7015875" y="1428475"/>
+            <a:ext cx="1977900" cy="973800"/>
+          </a:xfrm>
+          <a:prstGeom prst="rect">
+            <a:avLst/>
+          </a:prstGeom>
+          <a:noFill/>
+          <a:ln cap="flat" cmpd="sng" w="9525">
+            <a:solidFill>
+              <a:srgbClr val="FF0000"/>
+            </a:solidFill>
+            <a:prstDash val="solid"/>
+            <a:round/>
+            <a:headEnd len="sm" w="sm" type="none"/>
+            <a:tailEnd len="sm" w="sm" type="none"/>
+          </a:ln>
+        </p:spPr>
+        <p:txBody>
+          <a:bodyPr anchorCtr="0" anchor="t" bIns="91425" lIns="91425" spcFirstLastPara="1" rIns="91425" wrap="square" tIns="91425">
+            <a:noAutofit/>
+          </a:bodyPr>
+          <a:lstStyle/>
+          <a:p>
+            <a:pPr indent="0" lvl="0" marL="0" rtl="0" algn="l">
+              <a:spcBef>
+                <a:spcPts val="0"/>
+              </a:spcBef>
+              <a:spcAft>
+                <a:spcPts val="0"/>
+              </a:spcAft>
+              <a:buNone/>
+            </a:pPr>
+            <a:r>
+              <a:t/>
+            </a:r>
+            <a:endParaRPr>
+              <a:latin typeface="Roboto"/>
+              <a:ea typeface="Roboto"/>
+              <a:cs typeface="Roboto"/>
+              <a:sym typeface="Roboto"/>
+            </a:endParaRPr>
+          </a:p>
+        </p:txBody>
+      </p:sp>
     </p:spTree>
   </p:cSld>
   <p:clrMapOvr>
@@ -10176,6 +10314,285 @@
 </file>
 
 <file path=ppt/theme/theme1.xml><?xml version="1.0" encoding="utf-8"?>
+<a:theme xmlns:a="http://schemas.openxmlformats.org/drawingml/2006/main" xmlns:r="http://schemas.openxmlformats.org/officeDocument/2006/relationships">
+  <a:themeElements>
+    <a:clrScheme name="Default">
+      <a:dk1>
+        <a:srgbClr val="000000"/>
+      </a:dk1>
+      <a:lt1>
+        <a:srgbClr val="FFFFFF"/>
+      </a:lt1>
+      <a:dk2>
+        <a:srgbClr val="158158"/>
+      </a:dk2>
+      <a:lt2>
+        <a:srgbClr val="F3F3F3"/>
+      </a:lt2>
+      <a:accent1>
+        <a:srgbClr val="058DC7"/>
+      </a:accent1>
+      <a:accent2>
+        <a:srgbClr val="50B432"/>
+      </a:accent2>
+      <a:accent3>
+        <a:srgbClr val="ED561B"/>
+      </a:accent3>
+      <a:accent4>
+        <a:srgbClr val="EDEF00"/>
+      </a:accent4>
+      <a:accent5>
+        <a:srgbClr val="24CBE5"/>
+      </a:accent5>
+      <a:accent6>
+        <a:srgbClr val="64E572"/>
+      </a:accent6>
+      <a:hlink>
+        <a:srgbClr val="2200CC"/>
+      </a:hlink>
+      <a:folHlink>
+        <a:srgbClr val="551A8B"/>
+      </a:folHlink>
+    </a:clrScheme>
+    <a:fontScheme name="Office">
+      <a:majorFont>
+        <a:latin typeface="Arial"/>
+        <a:ea typeface=""/>
+        <a:cs typeface=""/>
+        <a:font script="Jpan" typeface="ＭＳ Ｐゴシック"/>
+        <a:font script="Hang" typeface="맑은 고딕"/>
+        <a:font script="Hans" typeface="宋体"/>
+        <a:font script="Hant" typeface="新細明體"/>
+        <a:font script="Arab" typeface="Times New Roman"/>
+        <a:font script="Hebr" typeface="Times New Roman"/>
+        <a:font script="Thai" typeface="Angsana New"/>
+        <a:font script="Ethi" typeface="Nyala"/>
+        <a:font script="Beng" typeface="Vrinda"/>
+        <a:font script="Gujr" typeface="Shruti"/>
+        <a:font script="Khmr" typeface="MoolBoran"/>
+        <a:font script="Knda" typeface="Tunga"/>
+        <a:font script="Guru" typeface="Raavi"/>
+        <a:font script="Cans" typeface="Euphemia"/>
+        <a:font script="Cher" typeface="Plantagenet Cherokee"/>
+        <a:font script="Yiii" typeface="Microsoft Yi Baiti"/>
+        <a:font script="Tibt" typeface="Microsoft Himalaya"/>
+        <a:font script="Thaa" typeface="MV Boli"/>
+        <a:font script="Deva" typeface="Mangal"/>
+        <a:font script="Telu" typeface="Gautami"/>
+        <a:font script="Taml" typeface="Latha"/>
+        <a:font script="Syrc" typeface="Estrangelo Edessa"/>
+        <a:font script="Orya" typeface="Kalinga"/>
+        <a:font script="Mlym" typeface="Kartika"/>
+        <a:font script="Laoo" typeface="DokChampa"/>
+        <a:font script="Sinh" typeface="Iskoola Pota"/>
+        <a:font script="Mong" typeface="Mongolian Baiti"/>
+        <a:font script="Viet" typeface="Times New Roman"/>
+        <a:font script="Uigh" typeface="Microsoft Uighur"/>
+        <a:font script="Geor" typeface="Sylfaen"/>
+      </a:majorFont>
+      <a:minorFont>
+        <a:latin typeface="Arial"/>
+        <a:ea typeface=""/>
+        <a:cs typeface=""/>
+        <a:font script="Jpan" typeface="ＭＳ Ｐゴシック"/>
+        <a:font script="Hang" typeface="맑은 고딕"/>
+        <a:font script="Hans" typeface="宋体"/>
+        <a:font script="Hant" typeface="新細明體"/>
+        <a:font script="Arab" typeface="Arial"/>
+        <a:font script="Hebr" typeface="Arial"/>
+        <a:font script="Thai" typeface="Cordia New"/>
+        <a:font script="Ethi" typeface="Nyala"/>
+        <a:font script="Beng" typeface="Vrinda"/>
+        <a:font script="Gujr" typeface="Shruti"/>
+        <a:font script="Khmr" typeface="DaunPenh"/>
+        <a:font script="Knda" typeface="Tunga"/>
+        <a:font script="Guru" typeface="Raavi"/>
+        <a:font script="Cans" typeface="Euphemia"/>
+        <a:font script="Cher" typeface="Plantagenet Cherokee"/>
+        <a:font script="Yiii" typeface="Microsoft Yi Baiti"/>
+        <a:font script="Tibt" typeface="Microsoft Himalaya"/>
+        <a:font script="Thaa" typeface="MV Boli"/>
+        <a:font script="Deva" typeface="Mangal"/>
+        <a:font script="Telu" typeface="Gautami"/>
+        <a:font script="Taml" typeface="Latha"/>
+        <a:font script="Syrc" typeface="Estrangelo Edessa"/>
+        <a:font script="Orya" typeface="Kalinga"/>
+        <a:font script="Mlym" typeface="Kartika"/>
+        <a:font script="Laoo" typeface="DokChampa"/>
+        <a:font script="Sinh" typeface="Iskoola Pota"/>
+        <a:font script="Mong" typeface="Mongolian Baiti"/>
+        <a:font script="Viet" typeface="Arial"/>
+        <a:font script="Uigh" typeface="Microsoft Uighur"/>
+        <a:font script="Geor" typeface="Sylfaen"/>
+      </a:minorFont>
+    </a:fontScheme>
+    <a:fmtScheme name="Office">
+      <a:fillStyleLst>
+        <a:solidFill>
+          <a:schemeClr val="phClr"/>
+        </a:solidFill>
+        <a:gradFill rotWithShape="1">
+          <a:gsLst>
+            <a:gs pos="0">
+              <a:schemeClr val="phClr">
+                <a:tint val="50000"/>
+                <a:satMod val="300000"/>
+              </a:schemeClr>
+            </a:gs>
+            <a:gs pos="35000">
+              <a:schemeClr val="phClr">
+                <a:tint val="37000"/>
+                <a:satMod val="300000"/>
+              </a:schemeClr>
+            </a:gs>
+            <a:gs pos="100000">
+              <a:schemeClr val="phClr">
+                <a:tint val="15000"/>
+                <a:satMod val="350000"/>
+              </a:schemeClr>
+            </a:gs>
+          </a:gsLst>
+          <a:lin ang="16200000" scaled="1"/>
+        </a:gradFill>
+        <a:gradFill rotWithShape="1">
+          <a:gsLst>
+            <a:gs pos="0">
+              <a:schemeClr val="phClr">
+                <a:tint val="100000"/>
+                <a:shade val="100000"/>
+                <a:satMod val="130000"/>
+              </a:schemeClr>
+            </a:gs>
+            <a:gs pos="100000">
+              <a:schemeClr val="phClr">
+                <a:tint val="50000"/>
+                <a:shade val="100000"/>
+                <a:satMod val="350000"/>
+              </a:schemeClr>
+            </a:gs>
+          </a:gsLst>
+          <a:lin ang="16200000" scaled="0"/>
+        </a:gradFill>
+      </a:fillStyleLst>
+      <a:lnStyleLst>
+        <a:ln w="9525" cap="flat" cmpd="sng" algn="ctr">
+          <a:solidFill>
+            <a:schemeClr val="phClr">
+              <a:shade val="95000"/>
+              <a:satMod val="105000"/>
+            </a:schemeClr>
+          </a:solidFill>
+          <a:prstDash val="solid"/>
+        </a:ln>
+        <a:ln w="25400" cap="flat" cmpd="sng" algn="ctr">
+          <a:solidFill>
+            <a:schemeClr val="phClr"/>
+          </a:solidFill>
+          <a:prstDash val="solid"/>
+        </a:ln>
+        <a:ln w="38100" cap="flat" cmpd="sng" algn="ctr">
+          <a:solidFill>
+            <a:schemeClr val="phClr"/>
+          </a:solidFill>
+          <a:prstDash val="solid"/>
+        </a:ln>
+      </a:lnStyleLst>
+      <a:effectStyleLst>
+        <a:effectStyle>
+          <a:effectLst>
+            <a:outerShdw blurRad="40000" dist="20000" dir="5400000" rotWithShape="0">
+              <a:srgbClr val="000000">
+                <a:alpha val="38000"/>
+              </a:srgbClr>
+            </a:outerShdw>
+          </a:effectLst>
+        </a:effectStyle>
+        <a:effectStyle>
+          <a:effectLst>
+            <a:outerShdw blurRad="40000" dist="23000" dir="5400000" rotWithShape="0">
+              <a:srgbClr val="000000">
+                <a:alpha val="35000"/>
+              </a:srgbClr>
+            </a:outerShdw>
+          </a:effectLst>
+        </a:effectStyle>
+        <a:effectStyle>
+          <a:effectLst>
+            <a:outerShdw blurRad="40000" dist="23000" dir="5400000" rotWithShape="0">
+              <a:srgbClr val="000000">
+                <a:alpha val="35000"/>
+              </a:srgbClr>
+            </a:outerShdw>
+          </a:effectLst>
+          <a:scene3d>
+            <a:camera prst="orthographicFront">
+              <a:rot lat="0" lon="0" rev="0"/>
+            </a:camera>
+            <a:lightRig rig="threePt" dir="t">
+              <a:rot lat="0" lon="0" rev="1200000"/>
+            </a:lightRig>
+          </a:scene3d>
+          <a:sp3d>
+            <a:bevelT w="63500" h="25400"/>
+          </a:sp3d>
+        </a:effectStyle>
+      </a:effectStyleLst>
+      <a:bgFillStyleLst>
+        <a:solidFill>
+          <a:schemeClr val="phClr"/>
+        </a:solidFill>
+        <a:gradFill rotWithShape="1">
+          <a:gsLst>
+            <a:gs pos="0">
+              <a:schemeClr val="phClr">
+                <a:tint val="40000"/>
+                <a:satMod val="350000"/>
+              </a:schemeClr>
+            </a:gs>
+            <a:gs pos="40000">
+              <a:schemeClr val="phClr">
+                <a:tint val="45000"/>
+                <a:shade val="99000"/>
+                <a:satMod val="350000"/>
+              </a:schemeClr>
+            </a:gs>
+            <a:gs pos="100000">
+              <a:schemeClr val="phClr">
+                <a:shade val="20000"/>
+                <a:satMod val="255000"/>
+              </a:schemeClr>
+            </a:gs>
+          </a:gsLst>
+          <a:path path="circle">
+            <a:fillToRect l="50000" t="-80000" r="50000" b="180000"/>
+          </a:path>
+        </a:gradFill>
+        <a:gradFill rotWithShape="1">
+          <a:gsLst>
+            <a:gs pos="0">
+              <a:schemeClr val="phClr">
+                <a:tint val="80000"/>
+                <a:satMod val="300000"/>
+              </a:schemeClr>
+            </a:gs>
+            <a:gs pos="100000">
+              <a:schemeClr val="phClr">
+                <a:shade val="30000"/>
+                <a:satMod val="200000"/>
+              </a:schemeClr>
+            </a:gs>
+          </a:gsLst>
+          <a:path path="circle">
+            <a:fillToRect l="50000" t="50000" r="50000" b="50000"/>
+          </a:path>
+        </a:gradFill>
+      </a:bgFillStyleLst>
+    </a:fmtScheme>
+  </a:themeElements>
+</a:theme>
+</file>
+
+<file path=ppt/theme/theme2.xml><?xml version="1.0" encoding="utf-8"?>
 <a:theme xmlns:a="http://schemas.openxmlformats.org/drawingml/2006/main" xmlns:r="http://schemas.openxmlformats.org/officeDocument/2006/relationships" name="Geometric">
   <a:themeElements>
     <a:clrScheme name="Geometric">
@@ -10452,283 +10869,4 @@
     </a:fmtScheme>
   </a:themeElements>
 </a:theme>
-</file>
-
-<file path=ppt/theme/theme2.xml><?xml version="1.0" encoding="utf-8"?>
-<a:theme xmlns:a="http://schemas.openxmlformats.org/drawingml/2006/main" xmlns:r="http://schemas.openxmlformats.org/officeDocument/2006/relationships">
-  <a:themeElements>
-    <a:clrScheme name="Default">
-      <a:dk1>
-        <a:srgbClr val="000000"/>
-      </a:dk1>
-      <a:lt1>
-        <a:srgbClr val="FFFFFF"/>
-      </a:lt1>
-      <a:dk2>
-        <a:srgbClr val="158158"/>
-      </a:dk2>
-      <a:lt2>
-        <a:srgbClr val="F3F3F3"/>
-      </a:lt2>
-      <a:accent1>
-        <a:srgbClr val="058DC7"/>
-      </a:accent1>
-      <a:accent2>
-        <a:srgbClr val="50B432"/>
-      </a:accent2>
-      <a:accent3>
-        <a:srgbClr val="ED561B"/>
-      </a:accent3>
-      <a:accent4>
-        <a:srgbClr val="EDEF00"/>
-      </a:accent4>
-      <a:accent5>
-        <a:srgbClr val="24CBE5"/>
-      </a:accent5>
-      <a:accent6>
-        <a:srgbClr val="64E572"/>
-      </a:accent6>
-      <a:hlink>
-        <a:srgbClr val="2200CC"/>
-      </a:hlink>
-      <a:folHlink>
-        <a:srgbClr val="551A8B"/>
-      </a:folHlink>
-    </a:clrScheme>
-    <a:fontScheme name="Office">
-      <a:majorFont>
-        <a:latin typeface="Arial"/>
-        <a:ea typeface=""/>
-        <a:cs typeface=""/>
-        <a:font script="Jpan" typeface="ＭＳ Ｐゴシック"/>
-        <a:font script="Hang" typeface="맑은 고딕"/>
-        <a:font script="Hans" typeface="宋体"/>
-        <a:font script="Hant" typeface="新細明體"/>
-        <a:font script="Arab" typeface="Times New Roman"/>
-        <a:font script="Hebr" typeface="Times New Roman"/>
-        <a:font script="Thai" typeface="Angsana New"/>
-        <a:font script="Ethi" typeface="Nyala"/>
-        <a:font script="Beng" typeface="Vrinda"/>
-        <a:font script="Gujr" typeface="Shruti"/>
-        <a:font script="Khmr" typeface="MoolBoran"/>
-        <a:font script="Knda" typeface="Tunga"/>
-        <a:font script="Guru" typeface="Raavi"/>
-        <a:font script="Cans" typeface="Euphemia"/>
-        <a:font script="Cher" typeface="Plantagenet Cherokee"/>
-        <a:font script="Yiii" typeface="Microsoft Yi Baiti"/>
-        <a:font script="Tibt" typeface="Microsoft Himalaya"/>
-        <a:font script="Thaa" typeface="MV Boli"/>
-        <a:font script="Deva" typeface="Mangal"/>
-        <a:font script="Telu" typeface="Gautami"/>
-        <a:font script="Taml" typeface="Latha"/>
-        <a:font script="Syrc" typeface="Estrangelo Edessa"/>
-        <a:font script="Orya" typeface="Kalinga"/>
-        <a:font script="Mlym" typeface="Kartika"/>
-        <a:font script="Laoo" typeface="DokChampa"/>
-        <a:font script="Sinh" typeface="Iskoola Pota"/>
-        <a:font script="Mong" typeface="Mongolian Baiti"/>
-        <a:font script="Viet" typeface="Times New Roman"/>
-        <a:font script="Uigh" typeface="Microsoft Uighur"/>
-        <a:font script="Geor" typeface="Sylfaen"/>
-      </a:majorFont>
-      <a:minorFont>
-        <a:latin typeface="Arial"/>
-        <a:ea typeface=""/>
-        <a:cs typeface=""/>
-        <a:font script="Jpan" typeface="ＭＳ Ｐゴシック"/>
-        <a:font script="Hang" typeface="맑은 고딕"/>
-        <a:font script="Hans" typeface="宋体"/>
-        <a:font script="Hant" typeface="新細明體"/>
-        <a:font script="Arab" typeface="Arial"/>
-        <a:font script="Hebr" typeface="Arial"/>
-        <a:font script="Thai" typeface="Cordia New"/>
-        <a:font script="Ethi" typeface="Nyala"/>
-        <a:font script="Beng" typeface="Vrinda"/>
-        <a:font script="Gujr" typeface="Shruti"/>
-        <a:font script="Khmr" typeface="DaunPenh"/>
-        <a:font script="Knda" typeface="Tunga"/>
-        <a:font script="Guru" typeface="Raavi"/>
-        <a:font script="Cans" typeface="Euphemia"/>
-        <a:font script="Cher" typeface="Plantagenet Cherokee"/>
-        <a:font script="Yiii" typeface="Microsoft Yi Baiti"/>
-        <a:font script="Tibt" typeface="Microsoft Himalaya"/>
-        <a:font script="Thaa" typeface="MV Boli"/>
-        <a:font script="Deva" typeface="Mangal"/>
-        <a:font script="Telu" typeface="Gautami"/>
-        <a:font script="Taml" typeface="Latha"/>
-        <a:font script="Syrc" typeface="Estrangelo Edessa"/>
-        <a:font script="Orya" typeface="Kalinga"/>
-        <a:font script="Mlym" typeface="Kartika"/>
-        <a:font script="Laoo" typeface="DokChampa"/>
-        <a:font script="Sinh" typeface="Iskoola Pota"/>
-        <a:font script="Mong" typeface="Mongolian Baiti"/>
-        <a:font script="Viet" typeface="Arial"/>
-        <a:font script="Uigh" typeface="Microsoft Uighur"/>
-        <a:font script="Geor" typeface="Sylfaen"/>
-      </a:minorFont>
-    </a:fontScheme>
-    <a:fmtScheme name="Office">
-      <a:fillStyleLst>
-        <a:solidFill>
-          <a:schemeClr val="phClr"/>
-        </a:solidFill>
-        <a:gradFill rotWithShape="1">
-          <a:gsLst>
-            <a:gs pos="0">
-              <a:schemeClr val="phClr">
-                <a:tint val="50000"/>
-                <a:satMod val="300000"/>
-              </a:schemeClr>
-            </a:gs>
-            <a:gs pos="35000">
-              <a:schemeClr val="phClr">
-                <a:tint val="37000"/>
-                <a:satMod val="300000"/>
-              </a:schemeClr>
-            </a:gs>
-            <a:gs pos="100000">
-              <a:schemeClr val="phClr">
-                <a:tint val="15000"/>
-                <a:satMod val="350000"/>
-              </a:schemeClr>
-            </a:gs>
-          </a:gsLst>
-          <a:lin ang="16200000" scaled="1"/>
-        </a:gradFill>
-        <a:gradFill rotWithShape="1">
-          <a:gsLst>
-            <a:gs pos="0">
-              <a:schemeClr val="phClr">
-                <a:tint val="100000"/>
-                <a:shade val="100000"/>
-                <a:satMod val="130000"/>
-              </a:schemeClr>
-            </a:gs>
-            <a:gs pos="100000">
-              <a:schemeClr val="phClr">
-                <a:tint val="50000"/>
-                <a:shade val="100000"/>
-                <a:satMod val="350000"/>
-              </a:schemeClr>
-            </a:gs>
-          </a:gsLst>
-          <a:lin ang="16200000" scaled="0"/>
-        </a:gradFill>
-      </a:fillStyleLst>
-      <a:lnStyleLst>
-        <a:ln w="9525" cap="flat" cmpd="sng" algn="ctr">
-          <a:solidFill>
-            <a:schemeClr val="phClr">
-              <a:shade val="95000"/>
-              <a:satMod val="105000"/>
-            </a:schemeClr>
-          </a:solidFill>
-          <a:prstDash val="solid"/>
-        </a:ln>
-        <a:ln w="25400" cap="flat" cmpd="sng" algn="ctr">
-          <a:solidFill>
-            <a:schemeClr val="phClr"/>
-          </a:solidFill>
-          <a:prstDash val="solid"/>
-        </a:ln>
-        <a:ln w="38100" cap="flat" cmpd="sng" algn="ctr">
-          <a:solidFill>
-            <a:schemeClr val="phClr"/>
-          </a:solidFill>
-          <a:prstDash val="solid"/>
-        </a:ln>
-      </a:lnStyleLst>
-      <a:effectStyleLst>
-        <a:effectStyle>
-          <a:effectLst>
-            <a:outerShdw blurRad="40000" dist="20000" dir="5400000" rotWithShape="0">
-              <a:srgbClr val="000000">
-                <a:alpha val="38000"/>
-              </a:srgbClr>
-            </a:outerShdw>
-          </a:effectLst>
-        </a:effectStyle>
-        <a:effectStyle>
-          <a:effectLst>
-            <a:outerShdw blurRad="40000" dist="23000" dir="5400000" rotWithShape="0">
-              <a:srgbClr val="000000">
-                <a:alpha val="35000"/>
-              </a:srgbClr>
-            </a:outerShdw>
-          </a:effectLst>
-        </a:effectStyle>
-        <a:effectStyle>
-          <a:effectLst>
-            <a:outerShdw blurRad="40000" dist="23000" dir="5400000" rotWithShape="0">
-              <a:srgbClr val="000000">
-                <a:alpha val="35000"/>
-              </a:srgbClr>
-            </a:outerShdw>
-          </a:effectLst>
-          <a:scene3d>
-            <a:camera prst="orthographicFront">
-              <a:rot lat="0" lon="0" rev="0"/>
-            </a:camera>
-            <a:lightRig rig="threePt" dir="t">
-              <a:rot lat="0" lon="0" rev="1200000"/>
-            </a:lightRig>
-          </a:scene3d>
-          <a:sp3d>
-            <a:bevelT w="63500" h="25400"/>
-          </a:sp3d>
-        </a:effectStyle>
-      </a:effectStyleLst>
-      <a:bgFillStyleLst>
-        <a:solidFill>
-          <a:schemeClr val="phClr"/>
-        </a:solidFill>
-        <a:gradFill rotWithShape="1">
-          <a:gsLst>
-            <a:gs pos="0">
-              <a:schemeClr val="phClr">
-                <a:tint val="40000"/>
-                <a:satMod val="350000"/>
-              </a:schemeClr>
-            </a:gs>
-            <a:gs pos="40000">
-              <a:schemeClr val="phClr">
-                <a:tint val="45000"/>
-                <a:shade val="99000"/>
-                <a:satMod val="350000"/>
-              </a:schemeClr>
-            </a:gs>
-            <a:gs pos="100000">
-              <a:schemeClr val="phClr">
-                <a:shade val="20000"/>
-                <a:satMod val="255000"/>
-              </a:schemeClr>
-            </a:gs>
-          </a:gsLst>
-          <a:path path="circle">
-            <a:fillToRect l="50000" t="-80000" r="50000" b="180000"/>
-          </a:path>
-        </a:gradFill>
-        <a:gradFill rotWithShape="1">
-          <a:gsLst>
-            <a:gs pos="0">
-              <a:schemeClr val="phClr">
-                <a:tint val="80000"/>
-                <a:satMod val="300000"/>
-              </a:schemeClr>
-            </a:gs>
-            <a:gs pos="100000">
-              <a:schemeClr val="phClr">
-                <a:shade val="30000"/>
-                <a:satMod val="200000"/>
-              </a:schemeClr>
-            </a:gs>
-          </a:gsLst>
-          <a:path path="circle">
-            <a:fillToRect l="50000" t="50000" r="50000" b="50000"/>
-          </a:path>
-        </a:gradFill>
-      </a:bgFillStyleLst>
-    </a:fmtScheme>
-  </a:themeElements>
-</a:theme>
 </file>
</xml_diff>